<commit_message>
Adding Dependencies and Readme File
</commit_message>
<xml_diff>
--- a/out/production/ECONOMY-DATA-VISUALIZATION-PROJECT/Economy_Data_Visualizaton_Presentation.pptx
+++ b/out/production/ECONOMY-DATA-VISUALIZATION-PROJECT/Economy_Data_Visualizaton_Presentation.pptx
@@ -2,18 +2,17 @@
 <file path=ppt/presentation.xml><?xml version="1.0" encoding="utf-8"?>
 <p:presentation xmlns:a="http://schemas.openxmlformats.org/drawingml/2006/main" xmlns:r="http://schemas.openxmlformats.org/officeDocument/2006/relationships" xmlns:p="http://schemas.openxmlformats.org/presentationml/2006/main" autoCompressPictures="0">
   <p:sldMasterIdLst>
-    <p:sldMasterId id="2147483648" r:id="rId1"/>
+    <p:sldMasterId id="2147483795" r:id="rId1"/>
   </p:sldMasterIdLst>
   <p:sldIdLst>
     <p:sldId id="256" r:id="rId2"/>
     <p:sldId id="257" r:id="rId3"/>
     <p:sldId id="258" r:id="rId4"/>
-    <p:sldId id="259" r:id="rId5"/>
-    <p:sldId id="260" r:id="rId6"/>
-    <p:sldId id="261" r:id="rId7"/>
-    <p:sldId id="263" r:id="rId8"/>
-    <p:sldId id="262" r:id="rId9"/>
-    <p:sldId id="264" r:id="rId10"/>
+    <p:sldId id="260" r:id="rId5"/>
+    <p:sldId id="261" r:id="rId6"/>
+    <p:sldId id="263" r:id="rId7"/>
+    <p:sldId id="262" r:id="rId8"/>
+    <p:sldId id="264" r:id="rId9"/>
   </p:sldIdLst>
   <p:sldSz cx="12192000" cy="6858000"/>
   <p:notesSz cx="6858000" cy="9144000"/>
@@ -120,6 +119,75 @@
 </p:presentation>
 </file>
 
+<file path=ppt/revisionInfo.xml><?xml version="1.0" encoding="utf-8"?>
+<p1510:revInfo xmlns:a="http://schemas.openxmlformats.org/drawingml/2006/main" xmlns:r="http://schemas.openxmlformats.org/officeDocument/2006/relationships" xmlns:p1510="http://schemas.microsoft.com/office/powerpoint/2015/10/main">
+  <p1510:revLst>
+    <p1510:client id="{0B48BC36-499A-4975-8AD0-F5039A225AA0}" v="2" dt="2022-11-10T09:40:48.873"/>
+  </p1510:revLst>
+</p1510:revInfo>
+</file>
+
+<file path=ppt/changesInfos/changesInfo1.xml><?xml version="1.0" encoding="utf-8"?>
+<pc:chgInfo xmlns:a="http://schemas.openxmlformats.org/drawingml/2006/main" xmlns:r="http://schemas.openxmlformats.org/officeDocument/2006/relationships" xmlns:ac="http://schemas.microsoft.com/office/drawing/2013/main/command" xmlns:pc="http://schemas.microsoft.com/office/powerpoint/2013/main/command">
+  <pc:docChgLst>
+    <pc:chgData name="Rathod Harshan" userId="35140d2fe3341ec0" providerId="LiveId" clId="{0B48BC36-499A-4975-8AD0-F5039A225AA0}"/>
+    <pc:docChg chg="custSel modSld">
+      <pc:chgData name="Rathod Harshan" userId="35140d2fe3341ec0" providerId="LiveId" clId="{0B48BC36-499A-4975-8AD0-F5039A225AA0}" dt="2022-11-10T09:41:12.068" v="11" actId="14100"/>
+      <pc:docMkLst>
+        <pc:docMk/>
+      </pc:docMkLst>
+      <pc:sldChg chg="addSp delSp modSp mod">
+        <pc:chgData name="Rathod Harshan" userId="35140d2fe3341ec0" providerId="LiveId" clId="{0B48BC36-499A-4975-8AD0-F5039A225AA0}" dt="2022-11-10T09:41:12.068" v="11" actId="14100"/>
+        <pc:sldMkLst>
+          <pc:docMk/>
+          <pc:sldMk cId="1200283913" sldId="263"/>
+        </pc:sldMkLst>
+        <pc:spChg chg="add del mod">
+          <ac:chgData name="Rathod Harshan" userId="35140d2fe3341ec0" providerId="LiveId" clId="{0B48BC36-499A-4975-8AD0-F5039A225AA0}" dt="2022-11-10T09:40:48.873" v="7" actId="931"/>
+          <ac:spMkLst>
+            <pc:docMk/>
+            <pc:sldMk cId="1200283913" sldId="263"/>
+            <ac:spMk id="4" creationId="{0F5D9CB2-5D84-BE2F-ABA1-0E6E7D510E40}"/>
+          </ac:spMkLst>
+        </pc:spChg>
+        <pc:spChg chg="add del mod">
+          <ac:chgData name="Rathod Harshan" userId="35140d2fe3341ec0" providerId="LiveId" clId="{0B48BC36-499A-4975-8AD0-F5039A225AA0}" dt="2022-11-10T05:29:59.312" v="1" actId="931"/>
+          <ac:spMkLst>
+            <pc:docMk/>
+            <pc:sldMk cId="1200283913" sldId="263"/>
+            <ac:spMk id="4" creationId="{B8B9F75F-F4BE-6FA9-3EC8-2C2BE10F1594}"/>
+          </ac:spMkLst>
+        </pc:spChg>
+        <pc:picChg chg="add del mod">
+          <ac:chgData name="Rathod Harshan" userId="35140d2fe3341ec0" providerId="LiveId" clId="{0B48BC36-499A-4975-8AD0-F5039A225AA0}" dt="2022-11-10T09:40:29.700" v="6" actId="478"/>
+          <ac:picMkLst>
+            <pc:docMk/>
+            <pc:sldMk cId="1200283913" sldId="263"/>
+            <ac:picMk id="6" creationId="{9E0B4916-D382-58AD-5630-0BCC93617260}"/>
+          </ac:picMkLst>
+        </pc:picChg>
+        <pc:picChg chg="del">
+          <ac:chgData name="Rathod Harshan" userId="35140d2fe3341ec0" providerId="LiveId" clId="{0B48BC36-499A-4975-8AD0-F5039A225AA0}" dt="2022-11-10T05:29:47.360" v="0" actId="478"/>
+          <ac:picMkLst>
+            <pc:docMk/>
+            <pc:sldMk cId="1200283913" sldId="263"/>
+            <ac:picMk id="7" creationId="{50D1C3C5-72A1-0084-264E-C215BAF59F30}"/>
+          </ac:picMkLst>
+        </pc:picChg>
+        <pc:picChg chg="add mod">
+          <ac:chgData name="Rathod Harshan" userId="35140d2fe3341ec0" providerId="LiveId" clId="{0B48BC36-499A-4975-8AD0-F5039A225AA0}" dt="2022-11-10T09:41:12.068" v="11" actId="14100"/>
+          <ac:picMkLst>
+            <pc:docMk/>
+            <pc:sldMk cId="1200283913" sldId="263"/>
+            <ac:picMk id="7" creationId="{89AEB1C1-B34B-50A7-4D77-805E6E49D8C5}"/>
+          </ac:picMkLst>
+        </pc:picChg>
+      </pc:sldChg>
+    </pc:docChg>
+  </pc:docChgLst>
+</pc:chgInfo>
+</file>
+
 <file path=ppt/slideLayouts/slideLayout1.xml><?xml version="1.0" encoding="utf-8"?>
 <p:sldLayout xmlns:a="http://schemas.openxmlformats.org/drawingml/2006/main" xmlns:r="http://schemas.openxmlformats.org/officeDocument/2006/relationships" xmlns:p="http://schemas.openxmlformats.org/presentationml/2006/main" type="title" preserve="1">
   <p:cSld name="Title Slide">
@@ -348,9 +416,9 @@
           <a:lstStyle/>
           <a:p>
             <a:fld id="{B61BEF0D-F0BB-DE4B-95CE-6DB70DBA9567}" type="datetimeFigureOut">
-              <a:rPr lang="en-US" dirty="0"/>
+              <a:rPr lang="en-US" smtClean="0"/>
               <a:pPr/>
-              <a:t>10/13/2022</a:t>
+              <a:t>11/10/2022</a:t>
             </a:fld>
             <a:endParaRPr lang="en-US" dirty="0"/>
           </a:p>
@@ -401,7 +469,7 @@
           <a:lstStyle/>
           <a:p>
             <a:fld id="{D57F1E4F-1CFF-5643-939E-217C01CDF565}" type="slidenum">
-              <a:rPr lang="en-US" dirty="0"/>
+              <a:rPr lang="en-US" smtClean="0"/>
               <a:pPr/>
               <a:t>‹#›</a:t>
             </a:fld>
@@ -410,6 +478,11 @@
         </p:txBody>
       </p:sp>
     </p:spTree>
+    <p:extLst>
+      <p:ext uri="{BB962C8B-B14F-4D97-AF65-F5344CB8AC3E}">
+        <p14:creationId xmlns:p14="http://schemas.microsoft.com/office/powerpoint/2010/main" val="652729726"/>
+      </p:ext>
+    </p:extLst>
   </p:cSld>
   <p:clrMapOvr>
     <a:overrideClrMapping bg1="dk1" tx1="lt1" bg2="dk2" tx2="lt2" accent1="accent1" accent2="accent2" accent3="accent3" accent4="accent4" accent5="accent5" accent6="accent6" hlink="hlink" folHlink="folHlink"/>
@@ -679,9 +752,9 @@
           <a:lstStyle/>
           <a:p>
             <a:fld id="{B61BEF0D-F0BB-DE4B-95CE-6DB70DBA9567}" type="datetimeFigureOut">
-              <a:rPr lang="en-US" dirty="0"/>
+              <a:rPr lang="en-US" smtClean="0"/>
               <a:pPr/>
-              <a:t>10/13/2022</a:t>
+              <a:t>11/10/2022</a:t>
             </a:fld>
             <a:endParaRPr lang="en-US" dirty="0"/>
           </a:p>
@@ -722,7 +795,7 @@
           <a:lstStyle/>
           <a:p>
             <a:fld id="{D57F1E4F-1CFF-5643-939E-217C01CDF565}" type="slidenum">
-              <a:rPr lang="en-US" dirty="0"/>
+              <a:rPr lang="en-US" smtClean="0"/>
               <a:pPr/>
               <a:t>‹#›</a:t>
             </a:fld>
@@ -731,6 +804,11 @@
         </p:txBody>
       </p:sp>
     </p:spTree>
+    <p:extLst>
+      <p:ext uri="{BB962C8B-B14F-4D97-AF65-F5344CB8AC3E}">
+        <p14:creationId xmlns:p14="http://schemas.microsoft.com/office/powerpoint/2010/main" val="736108357"/>
+      </p:ext>
+    </p:extLst>
   </p:cSld>
   <p:clrMapOvr>
     <a:masterClrMapping/>
@@ -954,9 +1032,9 @@
           <a:lstStyle/>
           <a:p>
             <a:fld id="{B61BEF0D-F0BB-DE4B-95CE-6DB70DBA9567}" type="datetimeFigureOut">
-              <a:rPr lang="en-US" dirty="0"/>
+              <a:rPr lang="en-US" smtClean="0"/>
               <a:pPr/>
-              <a:t>10/13/2022</a:t>
+              <a:t>11/10/2022</a:t>
             </a:fld>
             <a:endParaRPr lang="en-US" dirty="0"/>
           </a:p>
@@ -997,7 +1075,7 @@
           <a:lstStyle/>
           <a:p>
             <a:fld id="{D57F1E4F-1CFF-5643-939E-217C01CDF565}" type="slidenum">
-              <a:rPr lang="en-US" dirty="0"/>
+              <a:rPr lang="en-US" smtClean="0"/>
               <a:pPr/>
               <a:t>‹#›</a:t>
             </a:fld>
@@ -1006,6 +1084,11 @@
         </p:txBody>
       </p:sp>
     </p:spTree>
+    <p:extLst>
+      <p:ext uri="{BB962C8B-B14F-4D97-AF65-F5344CB8AC3E}">
+        <p14:creationId xmlns:p14="http://schemas.microsoft.com/office/powerpoint/2010/main" val="1034315465"/>
+      </p:ext>
+    </p:extLst>
   </p:cSld>
   <p:clrMapOvr>
     <a:masterClrMapping/>
@@ -1032,7 +1115,7 @@
       </p:grpSpPr>
       <p:pic>
         <p:nvPicPr>
-          <p:cNvPr id="16" name="Picture 15" descr="Celestia-R1---OverlayContentHD.png"/>
+          <p:cNvPr id="11" name="Picture 10" descr="Celestia-R1---OverlayContentHD.png"/>
           <p:cNvPicPr>
             <a:picLocks noChangeAspect="1"/>
           </p:cNvPicPr>
@@ -1062,7 +1145,7 @@
       </p:pic>
       <p:sp>
         <p:nvSpPr>
-          <p:cNvPr id="15" name="TextBox 14"/>
+          <p:cNvPr id="13" name="TextBox 12"/>
           <p:cNvSpPr txBox="1"/>
           <p:nvPr/>
         </p:nvSpPr>
@@ -1178,7 +1261,7 @@
       </p:sp>
       <p:sp>
         <p:nvSpPr>
-          <p:cNvPr id="11" name="TextBox 10"/>
+          <p:cNvPr id="14" name="TextBox 13"/>
           <p:cNvSpPr txBox="1"/>
           <p:nvPr/>
         </p:nvSpPr>
@@ -1294,7 +1377,7 @@
       </p:sp>
       <p:sp>
         <p:nvSpPr>
-          <p:cNvPr id="2" name="Title 1"/>
+          <p:cNvPr id="16" name="Title 1"/>
           <p:cNvSpPr>
             <a:spLocks noGrp="1"/>
           </p:cNvSpPr>
@@ -1519,9 +1602,9 @@
           <a:lstStyle/>
           <a:p>
             <a:fld id="{B61BEF0D-F0BB-DE4B-95CE-6DB70DBA9567}" type="datetimeFigureOut">
-              <a:rPr lang="en-US" dirty="0"/>
+              <a:rPr lang="en-US" smtClean="0"/>
               <a:pPr/>
-              <a:t>10/13/2022</a:t>
+              <a:t>11/10/2022</a:t>
             </a:fld>
             <a:endParaRPr lang="en-US" dirty="0"/>
           </a:p>
@@ -1562,7 +1645,7 @@
           <a:lstStyle/>
           <a:p>
             <a:fld id="{D57F1E4F-1CFF-5643-939E-217C01CDF565}" type="slidenum">
-              <a:rPr lang="en-US" dirty="0"/>
+              <a:rPr lang="en-US" smtClean="0"/>
               <a:pPr/>
               <a:t>‹#›</a:t>
             </a:fld>
@@ -1571,6 +1654,11 @@
         </p:txBody>
       </p:sp>
     </p:spTree>
+    <p:extLst>
+      <p:ext uri="{BB962C8B-B14F-4D97-AF65-F5344CB8AC3E}">
+        <p14:creationId xmlns:p14="http://schemas.microsoft.com/office/powerpoint/2010/main" val="845423676"/>
+      </p:ext>
+    </p:extLst>
   </p:cSld>
   <p:clrMapOvr>
     <a:masterClrMapping/>
@@ -1597,7 +1685,7 @@
       </p:grpSpPr>
       <p:pic>
         <p:nvPicPr>
-          <p:cNvPr id="8" name="Picture 7" descr="Celestia-R1---OverlayContentHD.png"/>
+          <p:cNvPr id="7" name="Picture 6" descr="Celestia-R1---OverlayContentHD.png"/>
           <p:cNvPicPr>
             <a:picLocks noChangeAspect="1"/>
           </p:cNvPicPr>
@@ -1794,9 +1882,9 @@
           <a:lstStyle/>
           <a:p>
             <a:fld id="{B61BEF0D-F0BB-DE4B-95CE-6DB70DBA9567}" type="datetimeFigureOut">
-              <a:rPr lang="en-US" dirty="0"/>
+              <a:rPr lang="en-US" smtClean="0"/>
               <a:pPr/>
-              <a:t>10/13/2022</a:t>
+              <a:t>11/10/2022</a:t>
             </a:fld>
             <a:endParaRPr lang="en-US" dirty="0"/>
           </a:p>
@@ -1837,7 +1925,7 @@
           <a:lstStyle/>
           <a:p>
             <a:fld id="{D57F1E4F-1CFF-5643-939E-217C01CDF565}" type="slidenum">
-              <a:rPr lang="en-US" dirty="0"/>
+              <a:rPr lang="en-US" smtClean="0"/>
               <a:pPr/>
               <a:t>‹#›</a:t>
             </a:fld>
@@ -1846,6 +1934,11 @@
         </p:txBody>
       </p:sp>
     </p:spTree>
+    <p:extLst>
+      <p:ext uri="{BB962C8B-B14F-4D97-AF65-F5344CB8AC3E}">
+        <p14:creationId xmlns:p14="http://schemas.microsoft.com/office/powerpoint/2010/main" val="545961930"/>
+      </p:ext>
+    </p:extLst>
   </p:cSld>
   <p:clrMapOvr>
     <a:masterClrMapping/>
@@ -2353,9 +2446,9 @@
           <a:lstStyle/>
           <a:p>
             <a:fld id="{B61BEF0D-F0BB-DE4B-95CE-6DB70DBA9567}" type="datetimeFigureOut">
-              <a:rPr lang="en-US" dirty="0"/>
+              <a:rPr lang="en-US" smtClean="0"/>
               <a:pPr/>
-              <a:t>10/13/2022</a:t>
+              <a:t>11/10/2022</a:t>
             </a:fld>
             <a:endParaRPr lang="en-US" dirty="0"/>
           </a:p>
@@ -2396,7 +2489,7 @@
           <a:lstStyle/>
           <a:p>
             <a:fld id="{D57F1E4F-1CFF-5643-939E-217C01CDF565}" type="slidenum">
-              <a:rPr lang="en-US" dirty="0"/>
+              <a:rPr lang="en-US" smtClean="0"/>
               <a:pPr/>
               <a:t>‹#›</a:t>
             </a:fld>
@@ -2405,6 +2498,11 @@
         </p:txBody>
       </p:sp>
     </p:spTree>
+    <p:extLst>
+      <p:ext uri="{BB962C8B-B14F-4D97-AF65-F5344CB8AC3E}">
+        <p14:creationId xmlns:p14="http://schemas.microsoft.com/office/powerpoint/2010/main" val="61485355"/>
+      </p:ext>
+    </p:extLst>
   </p:cSld>
   <p:clrMapOvr>
     <a:masterClrMapping/>
@@ -2677,9 +2775,9 @@
           <a:lstStyle/>
           <a:p>
             <a:fld id="{B61BEF0D-F0BB-DE4B-95CE-6DB70DBA9567}" type="datetimeFigureOut">
-              <a:rPr lang="en-US" dirty="0"/>
+              <a:rPr lang="en-US" smtClean="0"/>
               <a:pPr/>
-              <a:t>10/13/2022</a:t>
+              <a:t>11/10/2022</a:t>
             </a:fld>
             <a:endParaRPr lang="en-US" dirty="0"/>
           </a:p>
@@ -2720,7 +2818,7 @@
           <a:lstStyle/>
           <a:p>
             <a:fld id="{D57F1E4F-1CFF-5643-939E-217C01CDF565}" type="slidenum">
-              <a:rPr lang="en-US" dirty="0"/>
+              <a:rPr lang="en-US" smtClean="0"/>
               <a:pPr/>
               <a:t>‹#›</a:t>
             </a:fld>
@@ -2729,6 +2827,11 @@
         </p:txBody>
       </p:sp>
     </p:spTree>
+    <p:extLst>
+      <p:ext uri="{BB962C8B-B14F-4D97-AF65-F5344CB8AC3E}">
+        <p14:creationId xmlns:p14="http://schemas.microsoft.com/office/powerpoint/2010/main" val="1682936518"/>
+      </p:ext>
+    </p:extLst>
   </p:cSld>
   <p:clrMapOvr>
     <a:masterClrMapping/>
@@ -2785,125 +2888,6 @@
       </p:pic>
       <p:sp>
         <p:nvSpPr>
-          <p:cNvPr id="3" name="Vertical Text Placeholder 2"/>
-          <p:cNvSpPr>
-            <a:spLocks noGrp="1"/>
-          </p:cNvSpPr>
-          <p:nvPr>
-            <p:ph type="body" orient="vert" idx="1"/>
-          </p:nvPr>
-        </p:nvSpPr>
-        <p:spPr/>
-        <p:txBody>
-          <a:bodyPr vert="eaVert" anchor="t"/>
-          <a:lstStyle/>
-          <a:p>
-            <a:pPr lvl="0"/>
-            <a:r>
-              <a:rPr lang="en-US"/>
-              <a:t>Click to edit Master text styles</a:t>
-            </a:r>
-          </a:p>
-          <a:p>
-            <a:pPr lvl="1"/>
-            <a:r>
-              <a:rPr lang="en-US"/>
-              <a:t>Second level</a:t>
-            </a:r>
-          </a:p>
-          <a:p>
-            <a:pPr lvl="2"/>
-            <a:r>
-              <a:rPr lang="en-US"/>
-              <a:t>Third level</a:t>
-            </a:r>
-          </a:p>
-          <a:p>
-            <a:pPr lvl="3"/>
-            <a:r>
-              <a:rPr lang="en-US"/>
-              <a:t>Fourth level</a:t>
-            </a:r>
-          </a:p>
-          <a:p>
-            <a:pPr lvl="4"/>
-            <a:r>
-              <a:rPr lang="en-US"/>
-              <a:t>Fifth level</a:t>
-            </a:r>
-            <a:endParaRPr lang="en-US" dirty="0"/>
-          </a:p>
-        </p:txBody>
-      </p:sp>
-      <p:sp>
-        <p:nvSpPr>
-          <p:cNvPr id="4" name="Date Placeholder 3"/>
-          <p:cNvSpPr>
-            <a:spLocks noGrp="1"/>
-          </p:cNvSpPr>
-          <p:nvPr>
-            <p:ph type="dt" sz="half" idx="10"/>
-          </p:nvPr>
-        </p:nvSpPr>
-        <p:spPr/>
-        <p:txBody>
-          <a:bodyPr/>
-          <a:lstStyle/>
-          <a:p>
-            <a:fld id="{B61BEF0D-F0BB-DE4B-95CE-6DB70DBA9567}" type="datetimeFigureOut">
-              <a:rPr lang="en-US" dirty="0"/>
-              <a:pPr/>
-              <a:t>10/13/2022</a:t>
-            </a:fld>
-            <a:endParaRPr lang="en-US" dirty="0"/>
-          </a:p>
-        </p:txBody>
-      </p:sp>
-      <p:sp>
-        <p:nvSpPr>
-          <p:cNvPr id="5" name="Footer Placeholder 4"/>
-          <p:cNvSpPr>
-            <a:spLocks noGrp="1"/>
-          </p:cNvSpPr>
-          <p:nvPr>
-            <p:ph type="ftr" sz="quarter" idx="11"/>
-          </p:nvPr>
-        </p:nvSpPr>
-        <p:spPr/>
-        <p:txBody>
-          <a:bodyPr/>
-          <a:lstStyle/>
-          <a:p>
-            <a:endParaRPr lang="en-US" dirty="0"/>
-          </a:p>
-        </p:txBody>
-      </p:sp>
-      <p:sp>
-        <p:nvSpPr>
-          <p:cNvPr id="6" name="Slide Number Placeholder 5"/>
-          <p:cNvSpPr>
-            <a:spLocks noGrp="1"/>
-          </p:cNvSpPr>
-          <p:nvPr>
-            <p:ph type="sldNum" sz="quarter" idx="12"/>
-          </p:nvPr>
-        </p:nvSpPr>
-        <p:spPr/>
-        <p:txBody>
-          <a:bodyPr/>
-          <a:lstStyle/>
-          <a:p>
-            <a:fld id="{D57F1E4F-1CFF-5643-939E-217C01CDF565}" type="slidenum">
-              <a:rPr lang="en-US" dirty="0"/>
-              <a:pPr/>
-              <a:t>‹#›</a:t>
-            </a:fld>
-            <a:endParaRPr lang="en-US" dirty="0"/>
-          </a:p>
-        </p:txBody>
-      </p:sp>
-      <p:sp>
-        <p:nvSpPr>
           <p:cNvPr id="8" name="Title 1"/>
           <p:cNvSpPr>
             <a:spLocks noGrp="1"/>
@@ -2930,7 +2914,131 @@
           </a:p>
         </p:txBody>
       </p:sp>
+      <p:sp>
+        <p:nvSpPr>
+          <p:cNvPr id="3" name="Vertical Text Placeholder 2"/>
+          <p:cNvSpPr>
+            <a:spLocks noGrp="1"/>
+          </p:cNvSpPr>
+          <p:nvPr>
+            <p:ph type="body" orient="vert" idx="1"/>
+          </p:nvPr>
+        </p:nvSpPr>
+        <p:spPr/>
+        <p:txBody>
+          <a:bodyPr vert="eaVert" anchor="t"/>
+          <a:lstStyle/>
+          <a:p>
+            <a:pPr lvl="0"/>
+            <a:r>
+              <a:rPr lang="en-US"/>
+              <a:t>Click to edit Master text styles</a:t>
+            </a:r>
+          </a:p>
+          <a:p>
+            <a:pPr lvl="1"/>
+            <a:r>
+              <a:rPr lang="en-US"/>
+              <a:t>Second level</a:t>
+            </a:r>
+          </a:p>
+          <a:p>
+            <a:pPr lvl="2"/>
+            <a:r>
+              <a:rPr lang="en-US"/>
+              <a:t>Third level</a:t>
+            </a:r>
+          </a:p>
+          <a:p>
+            <a:pPr lvl="3"/>
+            <a:r>
+              <a:rPr lang="en-US"/>
+              <a:t>Fourth level</a:t>
+            </a:r>
+          </a:p>
+          <a:p>
+            <a:pPr lvl="4"/>
+            <a:r>
+              <a:rPr lang="en-US"/>
+              <a:t>Fifth level</a:t>
+            </a:r>
+            <a:endParaRPr lang="en-US" dirty="0"/>
+          </a:p>
+        </p:txBody>
+      </p:sp>
+      <p:sp>
+        <p:nvSpPr>
+          <p:cNvPr id="4" name="Date Placeholder 3"/>
+          <p:cNvSpPr>
+            <a:spLocks noGrp="1"/>
+          </p:cNvSpPr>
+          <p:nvPr>
+            <p:ph type="dt" sz="half" idx="10"/>
+          </p:nvPr>
+        </p:nvSpPr>
+        <p:spPr/>
+        <p:txBody>
+          <a:bodyPr/>
+          <a:lstStyle/>
+          <a:p>
+            <a:fld id="{B61BEF0D-F0BB-DE4B-95CE-6DB70DBA9567}" type="datetimeFigureOut">
+              <a:rPr lang="en-US" smtClean="0"/>
+              <a:pPr/>
+              <a:t>11/10/2022</a:t>
+            </a:fld>
+            <a:endParaRPr lang="en-US" dirty="0"/>
+          </a:p>
+        </p:txBody>
+      </p:sp>
+      <p:sp>
+        <p:nvSpPr>
+          <p:cNvPr id="5" name="Footer Placeholder 4"/>
+          <p:cNvSpPr>
+            <a:spLocks noGrp="1"/>
+          </p:cNvSpPr>
+          <p:nvPr>
+            <p:ph type="ftr" sz="quarter" idx="11"/>
+          </p:nvPr>
+        </p:nvSpPr>
+        <p:spPr/>
+        <p:txBody>
+          <a:bodyPr/>
+          <a:lstStyle/>
+          <a:p>
+            <a:endParaRPr lang="en-US" dirty="0"/>
+          </a:p>
+        </p:txBody>
+      </p:sp>
+      <p:sp>
+        <p:nvSpPr>
+          <p:cNvPr id="6" name="Slide Number Placeholder 5"/>
+          <p:cNvSpPr>
+            <a:spLocks noGrp="1"/>
+          </p:cNvSpPr>
+          <p:nvPr>
+            <p:ph type="sldNum" sz="quarter" idx="12"/>
+          </p:nvPr>
+        </p:nvSpPr>
+        <p:spPr/>
+        <p:txBody>
+          <a:bodyPr/>
+          <a:lstStyle/>
+          <a:p>
+            <a:fld id="{D57F1E4F-1CFF-5643-939E-217C01CDF565}" type="slidenum">
+              <a:rPr lang="en-US" smtClean="0"/>
+              <a:pPr/>
+              <a:t>‹#›</a:t>
+            </a:fld>
+            <a:endParaRPr lang="en-US" dirty="0"/>
+          </a:p>
+        </p:txBody>
+      </p:sp>
     </p:spTree>
+    <p:extLst>
+      <p:ext uri="{BB962C8B-B14F-4D97-AF65-F5344CB8AC3E}">
+        <p14:creationId xmlns:p14="http://schemas.microsoft.com/office/powerpoint/2010/main" val="400325647"/>
+      </p:ext>
+    </p:extLst>
   </p:cSld>
   <p:clrMapOvr>
     <a:masterClrMapping/>
@@ -3086,9 +3194,9 @@
           <a:lstStyle/>
           <a:p>
             <a:fld id="{B61BEF0D-F0BB-DE4B-95CE-6DB70DBA9567}" type="datetimeFigureOut">
-              <a:rPr lang="en-US" dirty="0"/>
+              <a:rPr lang="en-US" smtClean="0"/>
               <a:pPr/>
-              <a:t>10/13/2022</a:t>
+              <a:t>11/10/2022</a:t>
             </a:fld>
             <a:endParaRPr lang="en-US" dirty="0"/>
           </a:p>
@@ -3129,7 +3237,7 @@
           <a:lstStyle/>
           <a:p>
             <a:fld id="{D57F1E4F-1CFF-5643-939E-217C01CDF565}" type="slidenum">
-              <a:rPr lang="en-US" dirty="0"/>
+              <a:rPr lang="en-US" smtClean="0"/>
               <a:pPr/>
               <a:t>‹#›</a:t>
             </a:fld>
@@ -3138,6 +3246,11 @@
         </p:txBody>
       </p:sp>
     </p:spTree>
+    <p:extLst>
+      <p:ext uri="{BB962C8B-B14F-4D97-AF65-F5344CB8AC3E}">
+        <p14:creationId xmlns:p14="http://schemas.microsoft.com/office/powerpoint/2010/main" val="318372747"/>
+      </p:ext>
+    </p:extLst>
   </p:cSld>
   <p:clrMapOvr>
     <a:masterClrMapping/>
@@ -3283,9 +3396,9 @@
           <a:lstStyle/>
           <a:p>
             <a:fld id="{B61BEF0D-F0BB-DE4B-95CE-6DB70DBA9567}" type="datetimeFigureOut">
-              <a:rPr lang="en-US" dirty="0"/>
+              <a:rPr lang="en-US" smtClean="0"/>
               <a:pPr/>
-              <a:t>10/13/2022</a:t>
+              <a:t>11/10/2022</a:t>
             </a:fld>
             <a:endParaRPr lang="en-US" dirty="0"/>
           </a:p>
@@ -3326,7 +3439,7 @@
           <a:lstStyle/>
           <a:p>
             <a:fld id="{D57F1E4F-1CFF-5643-939E-217C01CDF565}" type="slidenum">
-              <a:rPr lang="en-US" dirty="0"/>
+              <a:rPr lang="en-US" smtClean="0"/>
               <a:pPr/>
               <a:t>‹#›</a:t>
             </a:fld>
@@ -3335,6 +3448,11 @@
         </p:txBody>
       </p:sp>
     </p:spTree>
+    <p:extLst>
+      <p:ext uri="{BB962C8B-B14F-4D97-AF65-F5344CB8AC3E}">
+        <p14:creationId xmlns:p14="http://schemas.microsoft.com/office/powerpoint/2010/main" val="359779197"/>
+      </p:ext>
+    </p:extLst>
   </p:cSld>
   <p:clrMapOvr>
     <a:masterClrMapping/>
@@ -3556,9 +3674,9 @@
           <a:lstStyle/>
           <a:p>
             <a:fld id="{B61BEF0D-F0BB-DE4B-95CE-6DB70DBA9567}" type="datetimeFigureOut">
-              <a:rPr lang="en-US" dirty="0"/>
+              <a:rPr lang="en-US" smtClean="0"/>
               <a:pPr/>
-              <a:t>10/13/2022</a:t>
+              <a:t>11/10/2022</a:t>
             </a:fld>
             <a:endParaRPr lang="en-US" dirty="0"/>
           </a:p>
@@ -3599,7 +3717,7 @@
           <a:lstStyle/>
           <a:p>
             <a:fld id="{D57F1E4F-1CFF-5643-939E-217C01CDF565}" type="slidenum">
-              <a:rPr lang="en-US" dirty="0"/>
+              <a:rPr lang="en-US" smtClean="0"/>
               <a:pPr/>
               <a:t>‹#›</a:t>
             </a:fld>
@@ -3608,6 +3726,11 @@
         </p:txBody>
       </p:sp>
     </p:spTree>
+    <p:extLst>
+      <p:ext uri="{BB962C8B-B14F-4D97-AF65-F5344CB8AC3E}">
+        <p14:creationId xmlns:p14="http://schemas.microsoft.com/office/powerpoint/2010/main" val="3650385166"/>
+      </p:ext>
+    </p:extLst>
   </p:cSld>
   <p:clrMapOvr>
     <a:masterClrMapping/>
@@ -3819,9 +3942,9 @@
           <a:lstStyle/>
           <a:p>
             <a:fld id="{B61BEF0D-F0BB-DE4B-95CE-6DB70DBA9567}" type="datetimeFigureOut">
-              <a:rPr lang="en-US" dirty="0"/>
+              <a:rPr lang="en-US" smtClean="0"/>
               <a:pPr/>
-              <a:t>10/13/2022</a:t>
+              <a:t>11/10/2022</a:t>
             </a:fld>
             <a:endParaRPr lang="en-US" dirty="0"/>
           </a:p>
@@ -3862,7 +3985,7 @@
           <a:lstStyle/>
           <a:p>
             <a:fld id="{D57F1E4F-1CFF-5643-939E-217C01CDF565}" type="slidenum">
-              <a:rPr lang="en-US" dirty="0"/>
+              <a:rPr lang="en-US" smtClean="0"/>
               <a:pPr/>
               <a:t>‹#›</a:t>
             </a:fld>
@@ -3871,6 +3994,11 @@
         </p:txBody>
       </p:sp>
     </p:spTree>
+    <p:extLst>
+      <p:ext uri="{BB962C8B-B14F-4D97-AF65-F5344CB8AC3E}">
+        <p14:creationId xmlns:p14="http://schemas.microsoft.com/office/powerpoint/2010/main" val="2660696988"/>
+      </p:ext>
+    </p:extLst>
   </p:cSld>
   <p:clrMapOvr>
     <a:masterClrMapping/>
@@ -4190,9 +4318,9 @@
           <a:lstStyle/>
           <a:p>
             <a:fld id="{B61BEF0D-F0BB-DE4B-95CE-6DB70DBA9567}" type="datetimeFigureOut">
-              <a:rPr lang="en-US" dirty="0"/>
+              <a:rPr lang="en-US" smtClean="0"/>
               <a:pPr/>
-              <a:t>10/13/2022</a:t>
+              <a:t>11/10/2022</a:t>
             </a:fld>
             <a:endParaRPr lang="en-US" dirty="0"/>
           </a:p>
@@ -4233,7 +4361,7 @@
           <a:lstStyle/>
           <a:p>
             <a:fld id="{D57F1E4F-1CFF-5643-939E-217C01CDF565}" type="slidenum">
-              <a:rPr lang="en-US" dirty="0"/>
+              <a:rPr lang="en-US" smtClean="0"/>
               <a:pPr/>
               <a:t>‹#›</a:t>
             </a:fld>
@@ -4242,6 +4370,11 @@
         </p:txBody>
       </p:sp>
     </p:spTree>
+    <p:extLst>
+      <p:ext uri="{BB962C8B-B14F-4D97-AF65-F5344CB8AC3E}">
+        <p14:creationId xmlns:p14="http://schemas.microsoft.com/office/powerpoint/2010/main" val="2328307450"/>
+      </p:ext>
+    </p:extLst>
   </p:cSld>
   <p:clrMapOvr>
     <a:masterClrMapping/>
@@ -4335,9 +4468,9 @@
           <a:lstStyle/>
           <a:p>
             <a:fld id="{B61BEF0D-F0BB-DE4B-95CE-6DB70DBA9567}" type="datetimeFigureOut">
-              <a:rPr lang="en-US" dirty="0"/>
+              <a:rPr lang="en-US" smtClean="0"/>
               <a:pPr/>
-              <a:t>10/13/2022</a:t>
+              <a:t>11/10/2022</a:t>
             </a:fld>
             <a:endParaRPr lang="en-US" dirty="0"/>
           </a:p>
@@ -4378,7 +4511,7 @@
           <a:lstStyle/>
           <a:p>
             <a:fld id="{D57F1E4F-1CFF-5643-939E-217C01CDF565}" type="slidenum">
-              <a:rPr lang="en-US" dirty="0"/>
+              <a:rPr lang="en-US" smtClean="0"/>
               <a:pPr/>
               <a:t>‹#›</a:t>
             </a:fld>
@@ -4387,6 +4520,11 @@
         </p:txBody>
       </p:sp>
     </p:spTree>
+    <p:extLst>
+      <p:ext uri="{BB962C8B-B14F-4D97-AF65-F5344CB8AC3E}">
+        <p14:creationId xmlns:p14="http://schemas.microsoft.com/office/powerpoint/2010/main" val="1059295345"/>
+      </p:ext>
+    </p:extLst>
   </p:cSld>
   <p:clrMapOvr>
     <a:masterClrMapping/>
@@ -4457,9 +4595,9 @@
           <a:lstStyle/>
           <a:p>
             <a:fld id="{B61BEF0D-F0BB-DE4B-95CE-6DB70DBA9567}" type="datetimeFigureOut">
-              <a:rPr lang="en-US" dirty="0"/>
+              <a:rPr lang="en-US" smtClean="0"/>
               <a:pPr/>
-              <a:t>10/13/2022</a:t>
+              <a:t>11/10/2022</a:t>
             </a:fld>
             <a:endParaRPr lang="en-US" dirty="0"/>
           </a:p>
@@ -4500,7 +4638,7 @@
           <a:lstStyle/>
           <a:p>
             <a:fld id="{D57F1E4F-1CFF-5643-939E-217C01CDF565}" type="slidenum">
-              <a:rPr lang="en-US" dirty="0"/>
+              <a:rPr lang="en-US" smtClean="0"/>
               <a:pPr/>
               <a:t>‹#›</a:t>
             </a:fld>
@@ -4509,6 +4647,11 @@
         </p:txBody>
       </p:sp>
     </p:spTree>
+    <p:extLst>
+      <p:ext uri="{BB962C8B-B14F-4D97-AF65-F5344CB8AC3E}">
+        <p14:creationId xmlns:p14="http://schemas.microsoft.com/office/powerpoint/2010/main" val="1554340655"/>
+      </p:ext>
+    </p:extLst>
   </p:cSld>
   <p:clrMapOvr>
     <a:masterClrMapping/>
@@ -4739,9 +4882,9 @@
           <a:lstStyle/>
           <a:p>
             <a:fld id="{B61BEF0D-F0BB-DE4B-95CE-6DB70DBA9567}" type="datetimeFigureOut">
-              <a:rPr lang="en-US" dirty="0"/>
+              <a:rPr lang="en-US" smtClean="0"/>
               <a:pPr/>
-              <a:t>10/13/2022</a:t>
+              <a:t>11/10/2022</a:t>
             </a:fld>
             <a:endParaRPr lang="en-US" dirty="0"/>
           </a:p>
@@ -4782,7 +4925,7 @@
           <a:lstStyle/>
           <a:p>
             <a:fld id="{D57F1E4F-1CFF-5643-939E-217C01CDF565}" type="slidenum">
-              <a:rPr lang="en-US" dirty="0"/>
+              <a:rPr lang="en-US" smtClean="0"/>
               <a:pPr/>
               <a:t>‹#›</a:t>
             </a:fld>
@@ -4791,6 +4934,11 @@
         </p:txBody>
       </p:sp>
     </p:spTree>
+    <p:extLst>
+      <p:ext uri="{BB962C8B-B14F-4D97-AF65-F5344CB8AC3E}">
+        <p14:creationId xmlns:p14="http://schemas.microsoft.com/office/powerpoint/2010/main" val="2901925513"/>
+      </p:ext>
+    </p:extLst>
   </p:cSld>
   <p:clrMapOvr>
     <a:masterClrMapping/>
@@ -5060,9 +5208,9 @@
           <a:lstStyle/>
           <a:p>
             <a:fld id="{B61BEF0D-F0BB-DE4B-95CE-6DB70DBA9567}" type="datetimeFigureOut">
-              <a:rPr lang="en-US" dirty="0"/>
+              <a:rPr lang="en-US" smtClean="0"/>
               <a:pPr/>
-              <a:t>10/13/2022</a:t>
+              <a:t>11/10/2022</a:t>
             </a:fld>
             <a:endParaRPr lang="en-US" dirty="0"/>
           </a:p>
@@ -5103,7 +5251,7 @@
           <a:lstStyle/>
           <a:p>
             <a:fld id="{D57F1E4F-1CFF-5643-939E-217C01CDF565}" type="slidenum">
-              <a:rPr lang="en-US" dirty="0"/>
+              <a:rPr lang="en-US" smtClean="0"/>
               <a:pPr/>
               <a:t>‹#›</a:t>
             </a:fld>
@@ -5112,6 +5260,11 @@
         </p:txBody>
       </p:sp>
     </p:spTree>
+    <p:extLst>
+      <p:ext uri="{BB962C8B-B14F-4D97-AF65-F5344CB8AC3E}">
+        <p14:creationId xmlns:p14="http://schemas.microsoft.com/office/powerpoint/2010/main" val="261697526"/>
+      </p:ext>
+    </p:extLst>
   </p:cSld>
   <p:clrMapOvr>
     <a:masterClrMapping/>
@@ -5271,9 +5424,9 @@
           </a:lstStyle>
           <a:p>
             <a:fld id="{B61BEF0D-F0BB-DE4B-95CE-6DB70DBA9567}" type="datetimeFigureOut">
-              <a:rPr lang="en-US" dirty="0"/>
+              <a:rPr lang="en-US" smtClean="0"/>
               <a:pPr/>
-              <a:t>10/13/2022</a:t>
+              <a:t>11/10/2022</a:t>
             </a:fld>
             <a:endParaRPr lang="en-US" dirty="0"/>
           </a:p>
@@ -5350,7 +5503,7 @@
           </a:lstStyle>
           <a:p>
             <a:fld id="{D57F1E4F-1CFF-5643-939E-217C01CDF565}" type="slidenum">
-              <a:rPr lang="en-US" dirty="0"/>
+              <a:rPr lang="en-US" smtClean="0"/>
               <a:pPr/>
               <a:t>‹#›</a:t>
             </a:fld>
@@ -5359,26 +5512,31 @@
         </p:txBody>
       </p:sp>
     </p:spTree>
+    <p:extLst>
+      <p:ext uri="{BB962C8B-B14F-4D97-AF65-F5344CB8AC3E}">
+        <p14:creationId xmlns:p14="http://schemas.microsoft.com/office/powerpoint/2010/main" val="498072037"/>
+      </p:ext>
+    </p:extLst>
   </p:cSld>
   <p:clrMap bg1="dk1" tx1="lt1" bg2="dk2" tx2="lt2" accent1="accent1" accent2="accent2" accent3="accent3" accent4="accent4" accent5="accent5" accent6="accent6" hlink="hlink" folHlink="folHlink"/>
   <p:sldLayoutIdLst>
-    <p:sldLayoutId id="2147483649" r:id="rId1"/>
-    <p:sldLayoutId id="2147483650" r:id="rId2"/>
-    <p:sldLayoutId id="2147483651" r:id="rId3"/>
-    <p:sldLayoutId id="2147483652" r:id="rId4"/>
-    <p:sldLayoutId id="2147483653" r:id="rId5"/>
-    <p:sldLayoutId id="2147483654" r:id="rId6"/>
-    <p:sldLayoutId id="2147483655" r:id="rId7"/>
-    <p:sldLayoutId id="2147483656" r:id="rId8"/>
-    <p:sldLayoutId id="2147483660" r:id="rId9"/>
-    <p:sldLayoutId id="2147483657" r:id="rId10"/>
-    <p:sldLayoutId id="2147483663" r:id="rId11"/>
-    <p:sldLayoutId id="2147483664" r:id="rId12"/>
-    <p:sldLayoutId id="2147483665" r:id="rId13"/>
-    <p:sldLayoutId id="2147483668" r:id="rId14"/>
-    <p:sldLayoutId id="2147483667" r:id="rId15"/>
-    <p:sldLayoutId id="2147483658" r:id="rId16"/>
-    <p:sldLayoutId id="2147483659" r:id="rId17"/>
+    <p:sldLayoutId id="2147483796" r:id="rId1"/>
+    <p:sldLayoutId id="2147483797" r:id="rId2"/>
+    <p:sldLayoutId id="2147483798" r:id="rId3"/>
+    <p:sldLayoutId id="2147483799" r:id="rId4"/>
+    <p:sldLayoutId id="2147483800" r:id="rId5"/>
+    <p:sldLayoutId id="2147483801" r:id="rId6"/>
+    <p:sldLayoutId id="2147483802" r:id="rId7"/>
+    <p:sldLayoutId id="2147483803" r:id="rId8"/>
+    <p:sldLayoutId id="2147483804" r:id="rId9"/>
+    <p:sldLayoutId id="2147483805" r:id="rId10"/>
+    <p:sldLayoutId id="2147483806" r:id="rId11"/>
+    <p:sldLayoutId id="2147483807" r:id="rId12"/>
+    <p:sldLayoutId id="2147483808" r:id="rId13"/>
+    <p:sldLayoutId id="2147483809" r:id="rId14"/>
+    <p:sldLayoutId id="2147483810" r:id="rId15"/>
+    <p:sldLayoutId id="2147483811" r:id="rId16"/>
+    <p:sldLayoutId id="2147483812" r:id="rId17"/>
   </p:sldLayoutIdLst>
   <p:txStyles>
     <p:titleStyle>
@@ -5901,11 +6059,17 @@
           <a:p>
             <a:r>
               <a:rPr lang="en-US" sz="4400" dirty="0">
+                <a:solidFill>
+                  <a:srgbClr val="FFFF00"/>
+                </a:solidFill>
                 <a:latin typeface="Algerian" panose="04020705040A02060702" pitchFamily="82" charset="0"/>
               </a:rPr>
               <a:t>objective</a:t>
             </a:r>
             <a:endParaRPr lang="en-IN" sz="4400" dirty="0">
+              <a:solidFill>
+                <a:srgbClr val="FFFF00"/>
+              </a:solidFill>
               <a:latin typeface="Algerian" panose="04020705040A02060702" pitchFamily="82" charset="0"/>
             </a:endParaRPr>
           </a:p>
@@ -5998,7 +6162,12 @@
             <p:ph type="title"/>
           </p:nvPr>
         </p:nvSpPr>
-        <p:spPr/>
+        <p:spPr>
+          <a:xfrm>
+            <a:off x="725488" y="368390"/>
+            <a:ext cx="10131425" cy="1456267"/>
+          </a:xfrm>
+        </p:spPr>
         <p:txBody>
           <a:bodyPr>
             <a:normAutofit/>
@@ -6007,36 +6176,47 @@
           <a:p>
             <a:r>
               <a:rPr lang="en-US" sz="4000" b="1" dirty="0">
-                <a:latin typeface="Algerian" panose="04020705040A02060702" pitchFamily="82" charset="0"/>
+                <a:solidFill>
+                  <a:srgbClr val="FFFF00"/>
+                </a:solidFill>
+                <a:latin typeface="Georgia" panose="02040502050405020303" pitchFamily="18" charset="0"/>
               </a:rPr>
               <a:t>Classes in our projects</a:t>
             </a:r>
             <a:endParaRPr lang="en-IN" sz="4000" b="1" dirty="0">
-              <a:latin typeface="Algerian" panose="04020705040A02060702" pitchFamily="82" charset="0"/>
+              <a:solidFill>
+                <a:srgbClr val="FFFF00"/>
+              </a:solidFill>
+              <a:latin typeface="Georgia" panose="02040502050405020303" pitchFamily="18" charset="0"/>
             </a:endParaRPr>
           </a:p>
         </p:txBody>
       </p:sp>
       <p:sp>
         <p:nvSpPr>
-          <p:cNvPr id="3" name="Content Placeholder 2">
+          <p:cNvPr id="4" name="TextBox 3">
             <a:extLst>
               <a:ext uri="{FF2B5EF4-FFF2-40B4-BE49-F238E27FC236}">
-                <a16:creationId xmlns:a16="http://schemas.microsoft.com/office/drawing/2014/main" id="{9717E2CD-85C2-93DB-D93A-42838340D3F8}"/>
+                <a16:creationId xmlns:a16="http://schemas.microsoft.com/office/drawing/2014/main" id="{BF848D0F-9260-0527-7DD3-EFD219248110}"/>
               </a:ext>
             </a:extLst>
           </p:cNvPr>
-          <p:cNvSpPr>
-            <a:spLocks noGrp="1"/>
-          </p:cNvSpPr>
-          <p:nvPr>
-            <p:ph idx="1"/>
-          </p:nvPr>
-        </p:nvSpPr>
-        <p:spPr/>
-        <p:txBody>
-          <a:bodyPr>
-            <a:normAutofit fontScale="85000" lnSpcReduction="20000"/>
+          <p:cNvSpPr txBox="1"/>
+          <p:nvPr/>
+        </p:nvSpPr>
+        <p:spPr>
+          <a:xfrm>
+            <a:off x="407988" y="1918306"/>
+            <a:ext cx="4324350" cy="1200329"/>
+          </a:xfrm>
+          <a:prstGeom prst="rect">
+            <a:avLst/>
+          </a:prstGeom>
+          <a:noFill/>
+        </p:spPr>
+        <p:txBody>
+          <a:bodyPr wrap="square" rtlCol="0">
+            <a:spAutoFit/>
           </a:bodyPr>
           <a:lstStyle/>
           <a:p>
@@ -6044,8 +6224,12 @@
               <a:buNone/>
             </a:pPr>
             <a:r>
+              <a:rPr lang="en-US" b="1" dirty="0"/>
+              <a:t>1) </a:t>
+            </a:r>
+            <a:r>
               <a:rPr lang="en-US" dirty="0"/>
-              <a:t>1 Development Indicator(Abstract Class)</a:t>
+              <a:t>Development Indicator(Abstract Class)</a:t>
             </a:r>
           </a:p>
           <a:p>
@@ -6072,12 +6256,48 @@
             </a:r>
           </a:p>
           <a:p>
+            <a:endParaRPr lang="en-IN" dirty="0"/>
+          </a:p>
+        </p:txBody>
+      </p:sp>
+      <p:sp>
+        <p:nvSpPr>
+          <p:cNvPr id="5" name="TextBox 4">
+            <a:extLst>
+              <a:ext uri="{FF2B5EF4-FFF2-40B4-BE49-F238E27FC236}">
+                <a16:creationId xmlns:a16="http://schemas.microsoft.com/office/drawing/2014/main" id="{7ADB1A81-6ABB-65B9-6091-399C3CD81F8D}"/>
+              </a:ext>
+            </a:extLst>
+          </p:cNvPr>
+          <p:cNvSpPr txBox="1"/>
+          <p:nvPr/>
+        </p:nvSpPr>
+        <p:spPr>
+          <a:xfrm>
+            <a:off x="5703888" y="1952626"/>
+            <a:ext cx="3695700" cy="1200329"/>
+          </a:xfrm>
+          <a:prstGeom prst="rect">
+            <a:avLst/>
+          </a:prstGeom>
+          <a:noFill/>
+        </p:spPr>
+        <p:txBody>
+          <a:bodyPr wrap="square" rtlCol="0">
+            <a:spAutoFit/>
+          </a:bodyPr>
+          <a:lstStyle/>
+          <a:p>
             <a:pPr marL="0" indent="0">
               <a:buNone/>
             </a:pPr>
             <a:r>
+              <a:rPr lang="en-US" b="1" dirty="0"/>
+              <a:t>2) </a:t>
+            </a:r>
+            <a:r>
               <a:rPr lang="en-US" dirty="0"/>
-              <a:t>2 Assets Indictor(Abstract Class)</a:t>
+              <a:t>Assets Indictor(Abstract Class)</a:t>
             </a:r>
           </a:p>
           <a:p>
@@ -6099,12 +6319,48 @@
             </a:r>
           </a:p>
           <a:p>
+            <a:endParaRPr lang="en-IN" dirty="0"/>
+          </a:p>
+        </p:txBody>
+      </p:sp>
+      <p:sp>
+        <p:nvSpPr>
+          <p:cNvPr id="6" name="TextBox 5">
+            <a:extLst>
+              <a:ext uri="{FF2B5EF4-FFF2-40B4-BE49-F238E27FC236}">
+                <a16:creationId xmlns:a16="http://schemas.microsoft.com/office/drawing/2014/main" id="{7A91EDDC-9CD8-E65F-D125-51BDB3AA66CA}"/>
+              </a:ext>
+            </a:extLst>
+          </p:cNvPr>
+          <p:cNvSpPr txBox="1"/>
+          <p:nvPr/>
+        </p:nvSpPr>
+        <p:spPr>
+          <a:xfrm>
+            <a:off x="484188" y="3199609"/>
+            <a:ext cx="3859212" cy="1200329"/>
+          </a:xfrm>
+          <a:prstGeom prst="rect">
+            <a:avLst/>
+          </a:prstGeom>
+          <a:noFill/>
+        </p:spPr>
+        <p:txBody>
+          <a:bodyPr wrap="square" rtlCol="0">
+            <a:spAutoFit/>
+          </a:bodyPr>
+          <a:lstStyle/>
+          <a:p>
             <a:pPr marL="0" indent="0">
               <a:buNone/>
             </a:pPr>
             <a:r>
+              <a:rPr lang="en-US" b="1" dirty="0"/>
+              <a:t>3) </a:t>
+            </a:r>
+            <a:r>
               <a:rPr lang="en-US" dirty="0"/>
-              <a:t>3 Exchange Rate</a:t>
+              <a:t>Exchange Rate</a:t>
             </a:r>
           </a:p>
           <a:p>
@@ -6131,29 +6387,233 @@
             </a:pPr>
             <a:r>
               <a:rPr lang="en-US" dirty="0"/>
-              <a:t>Functions</a:t>
-            </a:r>
-          </a:p>
+              <a:t> -Functions</a:t>
+            </a:r>
+          </a:p>
+        </p:txBody>
+      </p:sp>
+      <p:sp>
+        <p:nvSpPr>
+          <p:cNvPr id="9" name="TextBox 8">
+            <a:extLst>
+              <a:ext uri="{FF2B5EF4-FFF2-40B4-BE49-F238E27FC236}">
+                <a16:creationId xmlns:a16="http://schemas.microsoft.com/office/drawing/2014/main" id="{BBB7242E-D4C3-957C-47A9-A8E92F7242D1}"/>
+              </a:ext>
+            </a:extLst>
+          </p:cNvPr>
+          <p:cNvSpPr txBox="1"/>
+          <p:nvPr/>
+        </p:nvSpPr>
+        <p:spPr>
+          <a:xfrm>
+            <a:off x="5791201" y="3152955"/>
+            <a:ext cx="2495550" cy="923330"/>
+          </a:xfrm>
+          <a:prstGeom prst="rect">
+            <a:avLst/>
+          </a:prstGeom>
+          <a:noFill/>
+        </p:spPr>
+        <p:txBody>
+          <a:bodyPr wrap="square" rtlCol="0">
+            <a:spAutoFit/>
+          </a:bodyPr>
+          <a:lstStyle/>
           <a:p>
             <a:pPr marL="0" indent="0">
               <a:buNone/>
             </a:pPr>
             <a:r>
-              <a:rPr lang="en-US" dirty="0"/>
-              <a:t>4</a:t>
+              <a:rPr lang="en-IN" b="1" dirty="0"/>
+              <a:t>4) </a:t>
+            </a:r>
+            <a:r>
+              <a:rPr lang="en-IN" dirty="0"/>
+              <a:t>Deposit Interest Rate</a:t>
+            </a:r>
+          </a:p>
+          <a:p>
+            <a:pPr marL="0" indent="0">
+              <a:buNone/>
+            </a:pPr>
+            <a:r>
+              <a:rPr lang="en-IN" dirty="0"/>
+              <a:t>	-value(Double)</a:t>
+            </a:r>
+          </a:p>
+          <a:p>
+            <a:pPr marL="0" indent="0">
+              <a:buNone/>
+            </a:pPr>
+            <a:r>
+              <a:rPr lang="en-IN" dirty="0"/>
+              <a:t>	-year(Int)</a:t>
+            </a:r>
+          </a:p>
+        </p:txBody>
+      </p:sp>
+      <p:sp>
+        <p:nvSpPr>
+          <p:cNvPr id="10" name="TextBox 9">
+            <a:extLst>
+              <a:ext uri="{FF2B5EF4-FFF2-40B4-BE49-F238E27FC236}">
+                <a16:creationId xmlns:a16="http://schemas.microsoft.com/office/drawing/2014/main" id="{80EADA61-9464-8412-9A3D-49CB9BCE35D5}"/>
+              </a:ext>
+            </a:extLst>
+          </p:cNvPr>
+          <p:cNvSpPr txBox="1"/>
+          <p:nvPr/>
+        </p:nvSpPr>
+        <p:spPr>
+          <a:xfrm>
+            <a:off x="484188" y="4421924"/>
+            <a:ext cx="3687762" cy="1200329"/>
+          </a:xfrm>
+          <a:prstGeom prst="rect">
+            <a:avLst/>
+          </a:prstGeom>
+          <a:noFill/>
+        </p:spPr>
+        <p:txBody>
+          <a:bodyPr wrap="square" rtlCol="0">
+            <a:spAutoFit/>
+          </a:bodyPr>
+          <a:lstStyle/>
+          <a:p>
+            <a:pPr marL="0" indent="0">
+              <a:buNone/>
+            </a:pPr>
+            <a:r>
+              <a:rPr lang="en-IN" b="1" dirty="0"/>
+              <a:t>5) </a:t>
+            </a:r>
+            <a:r>
+              <a:rPr lang="en-IN" dirty="0"/>
+              <a:t>CPI</a:t>
+            </a:r>
+          </a:p>
+          <a:p>
+            <a:pPr marL="0" indent="0">
+              <a:buNone/>
+            </a:pPr>
+            <a:r>
+              <a:rPr lang="en-IN" dirty="0"/>
+              <a:t>	-Year(Int)</a:t>
             </a:r>
           </a:p>
           <a:p>
             <a:pPr marL="457200" lvl="1" indent="0">
               <a:buNone/>
             </a:pPr>
-            <a:endParaRPr lang="en-US" dirty="0"/>
+            <a:r>
+              <a:rPr lang="en-IN" dirty="0"/>
+              <a:t>-Value(Double)</a:t>
+            </a:r>
           </a:p>
           <a:p>
             <a:pPr marL="457200" lvl="1" indent="0">
               <a:buNone/>
             </a:pPr>
-            <a:endParaRPr lang="en-US" dirty="0"/>
+            <a:r>
+              <a:rPr lang="en-IN" dirty="0"/>
+              <a:t>-Inflation-Rate(Function)</a:t>
+            </a:r>
+          </a:p>
+        </p:txBody>
+      </p:sp>
+      <p:sp>
+        <p:nvSpPr>
+          <p:cNvPr id="11" name="TextBox 10">
+            <a:extLst>
+              <a:ext uri="{FF2B5EF4-FFF2-40B4-BE49-F238E27FC236}">
+                <a16:creationId xmlns:a16="http://schemas.microsoft.com/office/drawing/2014/main" id="{7670F220-D11C-53B7-ABBB-7C6AD8BBC44B}"/>
+              </a:ext>
+            </a:extLst>
+          </p:cNvPr>
+          <p:cNvSpPr txBox="1"/>
+          <p:nvPr/>
+        </p:nvSpPr>
+        <p:spPr>
+          <a:xfrm flipH="1">
+            <a:off x="5865492" y="4167128"/>
+            <a:ext cx="5974082" cy="2031325"/>
+          </a:xfrm>
+          <a:prstGeom prst="rect">
+            <a:avLst/>
+          </a:prstGeom>
+          <a:noFill/>
+        </p:spPr>
+        <p:txBody>
+          <a:bodyPr wrap="square" rtlCol="0">
+            <a:spAutoFit/>
+          </a:bodyPr>
+          <a:lstStyle/>
+          <a:p>
+            <a:pPr marL="0" indent="0">
+              <a:buNone/>
+            </a:pPr>
+            <a:r>
+              <a:rPr lang="en-IN" b="1" dirty="0"/>
+              <a:t>6) </a:t>
+            </a:r>
+            <a:r>
+              <a:rPr lang="en-IN" dirty="0"/>
+              <a:t>GDP</a:t>
+            </a:r>
+          </a:p>
+          <a:p>
+            <a:pPr marL="0" indent="0">
+              <a:buNone/>
+            </a:pPr>
+            <a:r>
+              <a:rPr lang="en-IN" dirty="0"/>
+              <a:t>	-Value(long)</a:t>
+            </a:r>
+          </a:p>
+          <a:p>
+            <a:pPr marL="0" indent="0">
+              <a:buNone/>
+            </a:pPr>
+            <a:r>
+              <a:rPr lang="en-IN" dirty="0"/>
+              <a:t>	-Unit(Static)</a:t>
+            </a:r>
+          </a:p>
+          <a:p>
+            <a:pPr marL="0" indent="0">
+              <a:buNone/>
+            </a:pPr>
+            <a:r>
+              <a:rPr lang="en-IN" dirty="0"/>
+              <a:t>	-Year(int)</a:t>
+            </a:r>
+          </a:p>
+          <a:p>
+            <a:pPr marL="0" indent="0">
+              <a:buNone/>
+            </a:pPr>
+            <a:r>
+              <a:rPr lang="en-IN" dirty="0"/>
+              <a:t>	-Import percentage (double)</a:t>
+            </a:r>
+          </a:p>
+          <a:p>
+            <a:pPr marL="0" indent="0">
+              <a:buNone/>
+            </a:pPr>
+            <a:r>
+              <a:rPr lang="en-IN" dirty="0"/>
+              <a:t>	-Export percentage (double)</a:t>
+            </a:r>
+          </a:p>
+          <a:p>
+            <a:pPr marL="0" indent="0">
+              <a:buNone/>
+            </a:pPr>
+            <a:r>
+              <a:rPr lang="en-IN" dirty="0"/>
+              <a:t>	-Tax-Revenue Percentage (double)</a:t>
+            </a:r>
           </a:p>
         </p:txBody>
       </p:sp>
@@ -6192,7 +6652,7 @@
           <p:cNvPr id="3" name="Content Placeholder 2">
             <a:extLst>
               <a:ext uri="{FF2B5EF4-FFF2-40B4-BE49-F238E27FC236}">
-                <a16:creationId xmlns:a16="http://schemas.microsoft.com/office/drawing/2014/main" id="{598B3EDD-6297-6BD0-59ED-3AFF91DDAFFE}"/>
+                <a16:creationId xmlns:a16="http://schemas.microsoft.com/office/drawing/2014/main" id="{31F5120D-8D61-FD9C-1554-43DFB709DC51}"/>
               </a:ext>
             </a:extLst>
           </p:cNvPr>
@@ -6205,13 +6665,13 @@
         </p:nvSpPr>
         <p:spPr>
           <a:xfrm>
-            <a:off x="685800" y="609601"/>
-            <a:ext cx="10131425" cy="5105400"/>
+            <a:off x="561976" y="2723555"/>
+            <a:ext cx="10131425" cy="2886075"/>
           </a:xfrm>
         </p:spPr>
         <p:txBody>
           <a:bodyPr>
-            <a:normAutofit fontScale="92500" lnSpcReduction="10000"/>
+            <a:normAutofit lnSpcReduction="10000"/>
           </a:bodyPr>
           <a:lstStyle/>
           <a:p>
@@ -6219,8 +6679,12 @@
               <a:buNone/>
             </a:pPr>
             <a:r>
-              <a:rPr lang="en-IN" dirty="0"/>
-              <a:t>4 Deposit Interest Rate</a:t>
+              <a:rPr lang="en-US" b="1" dirty="0"/>
+              <a:t>9</a:t>
+            </a:r>
+            <a:r>
+              <a:rPr lang="en-US" dirty="0"/>
+              <a:t>) Country</a:t>
             </a:r>
           </a:p>
           <a:p>
@@ -6228,8 +6692,8 @@
               <a:buNone/>
             </a:pPr>
             <a:r>
-              <a:rPr lang="en-IN" dirty="0"/>
-              <a:t>	-value(Double)</a:t>
+              <a:rPr lang="en-US" dirty="0"/>
+              <a:t>	-Name(String)  		 		 	-Code (String)   			</a:t>
             </a:r>
           </a:p>
           <a:p>
@@ -6237,8 +6701,8 @@
               <a:buNone/>
             </a:pPr>
             <a:r>
-              <a:rPr lang="en-IN" dirty="0"/>
-              <a:t>	-year(Int)</a:t>
+              <a:rPr lang="en-US" dirty="0"/>
+              <a:t>	- Exchange Rates (Array of Object)		- CPI’s (Array of Object)      	</a:t>
             </a:r>
           </a:p>
           <a:p>
@@ -6246,8 +6710,8 @@
               <a:buNone/>
             </a:pPr>
             <a:r>
-              <a:rPr lang="en-IN" dirty="0"/>
-              <a:t>5 CPI</a:t>
+              <a:rPr lang="en-US" dirty="0"/>
+              <a:t>	- Interest Rate (Array of Object) 		 -GDP’s(Array Of Object)  </a:t>
             </a:r>
           </a:p>
           <a:p>
@@ -6255,26 +6719,137 @@
               <a:buNone/>
             </a:pPr>
             <a:r>
-              <a:rPr lang="en-IN" dirty="0"/>
+              <a:rPr lang="en-US" dirty="0"/>
+              <a:t>	-Reserves(Array Of Objects)        		 -Population’s(Array Of Object)</a:t>
+            </a:r>
+          </a:p>
+          <a:p>
+            <a:pPr marL="0" indent="0">
+              <a:buNone/>
+            </a:pPr>
+            <a:endParaRPr lang="en-US" dirty="0"/>
+          </a:p>
+          <a:p>
+            <a:pPr marL="0" indent="0">
+              <a:buNone/>
+            </a:pPr>
+            <a:r>
+              <a:rPr lang="en-US" dirty="0"/>
+              <a:t>	-Functions to Get Data of Different Objects at different intervals of time.</a:t>
+            </a:r>
+          </a:p>
+          <a:p>
+            <a:pPr marL="0" indent="0">
+              <a:buNone/>
+            </a:pPr>
+            <a:endParaRPr lang="en-US" dirty="0"/>
+          </a:p>
+          <a:p>
+            <a:pPr marL="0" indent="0">
+              <a:buNone/>
+            </a:pPr>
+            <a:endParaRPr lang="en-US" dirty="0"/>
+          </a:p>
+        </p:txBody>
+      </p:sp>
+      <p:sp>
+        <p:nvSpPr>
+          <p:cNvPr id="2" name="TextBox 1">
+            <a:extLst>
+              <a:ext uri="{FF2B5EF4-FFF2-40B4-BE49-F238E27FC236}">
+                <a16:creationId xmlns:a16="http://schemas.microsoft.com/office/drawing/2014/main" id="{9AC244FC-E684-948A-0564-F37BAFF2290D}"/>
+              </a:ext>
+            </a:extLst>
+          </p:cNvPr>
+          <p:cNvSpPr txBox="1"/>
+          <p:nvPr/>
+        </p:nvSpPr>
+        <p:spPr>
+          <a:xfrm>
+            <a:off x="723901" y="610790"/>
+            <a:ext cx="3257550" cy="923330"/>
+          </a:xfrm>
+          <a:prstGeom prst="rect">
+            <a:avLst/>
+          </a:prstGeom>
+          <a:noFill/>
+        </p:spPr>
+        <p:txBody>
+          <a:bodyPr wrap="square" rtlCol="0">
+            <a:spAutoFit/>
+          </a:bodyPr>
+          <a:lstStyle/>
+          <a:p>
+            <a:pPr marL="0" indent="0">
+              <a:buNone/>
+            </a:pPr>
+            <a:r>
+              <a:rPr lang="en-US" b="1" dirty="0"/>
+              <a:t>7) </a:t>
+            </a:r>
+            <a:r>
+              <a:rPr lang="en-US" dirty="0"/>
+              <a:t>Reserves</a:t>
+            </a:r>
+          </a:p>
+          <a:p>
+            <a:pPr marL="0" indent="0">
+              <a:buNone/>
+            </a:pPr>
+            <a:r>
+              <a:rPr lang="en-US" dirty="0"/>
               <a:t>	-Year(Int)</a:t>
             </a:r>
           </a:p>
           <a:p>
-            <a:pPr marL="457200" lvl="1" indent="0">
+            <a:pPr marL="0" indent="0">
               <a:buNone/>
             </a:pPr>
             <a:r>
-              <a:rPr lang="en-IN" dirty="0"/>
-              <a:t>-Value(Double)</a:t>
-            </a:r>
-          </a:p>
-          <a:p>
-            <a:pPr marL="457200" lvl="1" indent="0">
+              <a:rPr lang="en-US" dirty="0"/>
+              <a:t>	-Value(long)</a:t>
+            </a:r>
+          </a:p>
+        </p:txBody>
+      </p:sp>
+      <p:sp>
+        <p:nvSpPr>
+          <p:cNvPr id="4" name="TextBox 3">
+            <a:extLst>
+              <a:ext uri="{FF2B5EF4-FFF2-40B4-BE49-F238E27FC236}">
+                <a16:creationId xmlns:a16="http://schemas.microsoft.com/office/drawing/2014/main" id="{02369BF6-C9FC-9A52-E889-F9A2BA54E6F4}"/>
+              </a:ext>
+            </a:extLst>
+          </p:cNvPr>
+          <p:cNvSpPr txBox="1"/>
+          <p:nvPr/>
+        </p:nvSpPr>
+        <p:spPr>
+          <a:xfrm>
+            <a:off x="6324600" y="610790"/>
+            <a:ext cx="3038475" cy="923330"/>
+          </a:xfrm>
+          <a:prstGeom prst="rect">
+            <a:avLst/>
+          </a:prstGeom>
+          <a:noFill/>
+        </p:spPr>
+        <p:txBody>
+          <a:bodyPr wrap="square" rtlCol="0">
+            <a:spAutoFit/>
+          </a:bodyPr>
+          <a:lstStyle/>
+          <a:p>
+            <a:pPr marL="0" indent="0">
               <a:buNone/>
             </a:pPr>
             <a:r>
-              <a:rPr lang="en-IN" dirty="0"/>
-              <a:t>-Inflation-Rate(Function)</a:t>
+              <a:rPr lang="en-US" b="1" dirty="0"/>
+              <a:t>8) </a:t>
+            </a:r>
+            <a:r>
+              <a:rPr lang="en-US" dirty="0"/>
+              <a:t>Population</a:t>
             </a:r>
           </a:p>
           <a:p>
@@ -6282,8 +6857,8 @@
               <a:buNone/>
             </a:pPr>
             <a:r>
-              <a:rPr lang="en-IN" dirty="0"/>
-              <a:t>6 GDP</a:t>
+              <a:rPr lang="en-US" dirty="0"/>
+              <a:t>	-Year(Int)</a:t>
             </a:r>
           </a:p>
           <a:p>
@@ -6291,67 +6866,16 @@
               <a:buNone/>
             </a:pPr>
             <a:r>
-              <a:rPr lang="en-IN" dirty="0"/>
+              <a:rPr lang="en-US" dirty="0"/>
               <a:t>	-Value(long)</a:t>
             </a:r>
-          </a:p>
-          <a:p>
-            <a:pPr marL="0" indent="0">
-              <a:buNone/>
-            </a:pPr>
-            <a:r>
-              <a:rPr lang="en-IN" dirty="0"/>
-              <a:t>	-Unit(Static)</a:t>
-            </a:r>
-          </a:p>
-          <a:p>
-            <a:pPr marL="0" indent="0">
-              <a:buNone/>
-            </a:pPr>
-            <a:r>
-              <a:rPr lang="en-IN" dirty="0"/>
-              <a:t>	-Year(int)</a:t>
-            </a:r>
-          </a:p>
-          <a:p>
-            <a:pPr marL="0" indent="0">
-              <a:buNone/>
-            </a:pPr>
-            <a:r>
-              <a:rPr lang="en-IN" dirty="0"/>
-              <a:t>	-Import percentage (double)</a:t>
-            </a:r>
-          </a:p>
-          <a:p>
-            <a:pPr marL="0" indent="0">
-              <a:buNone/>
-            </a:pPr>
-            <a:r>
-              <a:rPr lang="en-IN" dirty="0"/>
-              <a:t>	-Export percentage (double)</a:t>
-            </a:r>
-          </a:p>
-          <a:p>
-            <a:pPr marL="0" indent="0">
-              <a:buNone/>
-            </a:pPr>
-            <a:r>
-              <a:rPr lang="en-IN" dirty="0"/>
-              <a:t>	-Tax-Revenue Percentage (double)</a:t>
-            </a:r>
-          </a:p>
-          <a:p>
-            <a:pPr marL="0" indent="0">
-              <a:buNone/>
-            </a:pPr>
-            <a:endParaRPr lang="en-IN" dirty="0"/>
           </a:p>
         </p:txBody>
       </p:sp>
     </p:spTree>
     <p:extLst>
       <p:ext uri="{BB962C8B-B14F-4D97-AF65-F5344CB8AC3E}">
-        <p14:creationId xmlns:p14="http://schemas.microsoft.com/office/powerpoint/2010/main" val="3683463850"/>
+        <p14:creationId xmlns:p14="http://schemas.microsoft.com/office/powerpoint/2010/main" val="4121788743"/>
       </p:ext>
     </p:extLst>
   </p:cSld>
@@ -6383,7 +6907,7 @@
           <p:cNvPr id="3" name="Content Placeholder 2">
             <a:extLst>
               <a:ext uri="{FF2B5EF4-FFF2-40B4-BE49-F238E27FC236}">
-                <a16:creationId xmlns:a16="http://schemas.microsoft.com/office/drawing/2014/main" id="{31F5120D-8D61-FD9C-1554-43DFB709DC51}"/>
+                <a16:creationId xmlns:a16="http://schemas.microsoft.com/office/drawing/2014/main" id="{65FB9F5B-FC6E-9D3D-29E4-75D287D7D583}"/>
               </a:ext>
             </a:extLst>
           </p:cNvPr>
@@ -6396,8 +6920,8 @@
         </p:nvSpPr>
         <p:spPr>
           <a:xfrm>
-            <a:off x="685801" y="447675"/>
-            <a:ext cx="10131425" cy="5343525"/>
+            <a:off x="685801" y="257175"/>
+            <a:ext cx="10131425" cy="5534025"/>
           </a:xfrm>
         </p:spPr>
         <p:txBody>
@@ -6408,8 +6932,12 @@
               <a:buNone/>
             </a:pPr>
             <a:r>
-              <a:rPr lang="en-US" dirty="0"/>
-              <a:t>7) Reserves</a:t>
+              <a:rPr lang="en-IN" b="1" dirty="0"/>
+              <a:t>10) </a:t>
+            </a:r>
+            <a:r>
+              <a:rPr lang="en-IN" dirty="0"/>
+              <a:t>Economy Data Visualization</a:t>
             </a:r>
           </a:p>
           <a:p>
@@ -6417,8 +6945,8 @@
               <a:buNone/>
             </a:pPr>
             <a:r>
-              <a:rPr lang="en-US" dirty="0"/>
-              <a:t>	-Year(Int)</a:t>
+              <a:rPr lang="en-IN" dirty="0"/>
+              <a:t>	-Array Of Country Object</a:t>
             </a:r>
           </a:p>
           <a:p>
@@ -6426,8 +6954,8 @@
               <a:buNone/>
             </a:pPr>
             <a:r>
-              <a:rPr lang="en-US" dirty="0"/>
-              <a:t>	-Value(long)</a:t>
+              <a:rPr lang="en-IN" dirty="0"/>
+              <a:t>	-Function to take input from csv, implement database</a:t>
             </a:r>
           </a:p>
           <a:p>
@@ -6435,8 +6963,8 @@
               <a:buNone/>
             </a:pPr>
             <a:r>
-              <a:rPr lang="en-US" dirty="0"/>
-              <a:t>8) Population</a:t>
+              <a:rPr lang="en-IN" dirty="0"/>
+              <a:t>	-Implement GUI </a:t>
             </a:r>
           </a:p>
           <a:p>
@@ -6444,8 +6972,8 @@
               <a:buNone/>
             </a:pPr>
             <a:r>
-              <a:rPr lang="en-US" dirty="0"/>
-              <a:t>	-Year(Int)</a:t>
+              <a:rPr lang="en-IN" dirty="0"/>
+              <a:t>	-Function to Plots Graph for various parameters at different intervals of Time.</a:t>
             </a:r>
           </a:p>
           <a:p>
@@ -6453,8 +6981,8 @@
               <a:buNone/>
             </a:pPr>
             <a:r>
-              <a:rPr lang="en-US" dirty="0"/>
-              <a:t>	-Value(long)</a:t>
+              <a:rPr lang="en-IN" dirty="0"/>
+              <a:t>	-Methods to take input from user to update database</a:t>
             </a:r>
           </a:p>
           <a:p>
@@ -6462,64 +6990,16 @@
               <a:buNone/>
             </a:pPr>
             <a:r>
-              <a:rPr lang="en-US" dirty="0"/>
-              <a:t>9)Country</a:t>
-            </a:r>
-          </a:p>
-          <a:p>
-            <a:pPr marL="0" indent="0">
-              <a:buNone/>
-            </a:pPr>
-            <a:r>
-              <a:rPr lang="en-US" dirty="0"/>
-              <a:t>	-Name(String)  		  -Code (String)   			 - Exchange Rates (Array of Object)</a:t>
-            </a:r>
-          </a:p>
-          <a:p>
-            <a:pPr marL="0" indent="0">
-              <a:buNone/>
-            </a:pPr>
-            <a:r>
-              <a:rPr lang="en-US" dirty="0"/>
-              <a:t>	 - CPI’s (Array of Object)      	- Interest Rate (Array of Object) 		 -GDP’s(Array Of Object)  </a:t>
-            </a:r>
-          </a:p>
-          <a:p>
-            <a:pPr marL="0" indent="0">
-              <a:buNone/>
-            </a:pPr>
-            <a:r>
-              <a:rPr lang="en-US" dirty="0"/>
-              <a:t>	-Reserves(Array Of Objects)         -Population’s(Array Of Object)</a:t>
-            </a:r>
-          </a:p>
-          <a:p>
-            <a:pPr marL="0" indent="0">
-              <a:buNone/>
-            </a:pPr>
-            <a:r>
-              <a:rPr lang="en-US" dirty="0"/>
-              <a:t>	-Functions to Get Data of Different Objects at different intervals of time.</a:t>
-            </a:r>
-          </a:p>
-          <a:p>
-            <a:pPr marL="0" indent="0">
-              <a:buNone/>
-            </a:pPr>
-            <a:endParaRPr lang="en-US" dirty="0"/>
-          </a:p>
-          <a:p>
-            <a:pPr marL="0" indent="0">
-              <a:buNone/>
-            </a:pPr>
-            <a:endParaRPr lang="en-US" dirty="0"/>
+              <a:rPr lang="en-IN" dirty="0"/>
+              <a:t>	-Functions of Searching and Sorting.</a:t>
+            </a:r>
           </a:p>
         </p:txBody>
       </p:sp>
     </p:spTree>
     <p:extLst>
       <p:ext uri="{BB962C8B-B14F-4D97-AF65-F5344CB8AC3E}">
-        <p14:creationId xmlns:p14="http://schemas.microsoft.com/office/powerpoint/2010/main" val="4121788743"/>
+        <p14:creationId xmlns:p14="http://schemas.microsoft.com/office/powerpoint/2010/main" val="1150484880"/>
       </p:ext>
     </p:extLst>
   </p:cSld>
@@ -6548,10 +7028,10 @@
       </p:grpSpPr>
       <p:sp>
         <p:nvSpPr>
-          <p:cNvPr id="3" name="Content Placeholder 2">
+          <p:cNvPr id="2" name="Title 1">
             <a:extLst>
               <a:ext uri="{FF2B5EF4-FFF2-40B4-BE49-F238E27FC236}">
-                <a16:creationId xmlns:a16="http://schemas.microsoft.com/office/drawing/2014/main" id="{65FB9F5B-FC6E-9D3D-29E4-75D287D7D583}"/>
+                <a16:creationId xmlns:a16="http://schemas.microsoft.com/office/drawing/2014/main" id="{8CC4F131-68C9-7331-B804-5651A3233051}"/>
               </a:ext>
             </a:extLst>
           </p:cNvPr>
@@ -6559,87 +7039,65 @@
             <a:spLocks noGrp="1"/>
           </p:cNvSpPr>
           <p:nvPr>
-            <p:ph idx="1"/>
+            <p:ph type="title"/>
           </p:nvPr>
         </p:nvSpPr>
         <p:spPr>
           <a:xfrm>
-            <a:off x="685801" y="257175"/>
-            <a:ext cx="10131425" cy="5534025"/>
+            <a:off x="685801" y="390526"/>
+            <a:ext cx="10131425" cy="666750"/>
           </a:xfrm>
         </p:spPr>
         <p:txBody>
           <a:bodyPr/>
           <a:lstStyle/>
           <a:p>
-            <a:pPr marL="0" indent="0">
-              <a:buNone/>
-            </a:pPr>
-            <a:r>
-              <a:rPr lang="en-IN" dirty="0"/>
-              <a:t>10 Economy Data Visualization</a:t>
-            </a:r>
-          </a:p>
-          <a:p>
-            <a:pPr marL="0" indent="0">
-              <a:buNone/>
-            </a:pPr>
-            <a:r>
-              <a:rPr lang="en-IN" dirty="0"/>
-              <a:t>	-Array Of Country Object</a:t>
-            </a:r>
-          </a:p>
-          <a:p>
-            <a:pPr marL="0" indent="0">
-              <a:buNone/>
-            </a:pPr>
-            <a:r>
-              <a:rPr lang="en-IN" dirty="0"/>
-              <a:t>	-Function to take input from csv, implement database</a:t>
-            </a:r>
-          </a:p>
-          <a:p>
-            <a:pPr marL="0" indent="0">
-              <a:buNone/>
-            </a:pPr>
-            <a:r>
-              <a:rPr lang="en-IN" dirty="0"/>
-              <a:t>	-Implement GUI </a:t>
-            </a:r>
-          </a:p>
-          <a:p>
-            <a:pPr marL="0" indent="0">
-              <a:buNone/>
-            </a:pPr>
-            <a:r>
-              <a:rPr lang="en-IN" dirty="0"/>
-              <a:t>	-Function to Plots Graph for various parameters at different intervals of Time.</a:t>
-            </a:r>
-          </a:p>
-          <a:p>
-            <a:pPr marL="0" indent="0">
-              <a:buNone/>
-            </a:pPr>
-            <a:r>
-              <a:rPr lang="en-IN" dirty="0"/>
-              <a:t>	-Methods to take input from user to update database</a:t>
-            </a:r>
-          </a:p>
-          <a:p>
-            <a:pPr marL="0" indent="0">
-              <a:buNone/>
-            </a:pPr>
-            <a:r>
-              <a:rPr lang="en-IN" dirty="0"/>
-              <a:t>	-Functions of Searching and Sorting.</a:t>
-            </a:r>
-          </a:p>
-        </p:txBody>
-      </p:sp>
+            <a:pPr algn="ctr"/>
+            <a:r>
+              <a:rPr lang="en-IN" b="1" u="sng" dirty="0">
+                <a:solidFill>
+                  <a:srgbClr val="FFFF00"/>
+                </a:solidFill>
+                <a:latin typeface="Arial Rounded MT Bold" panose="020F0704030504030204" pitchFamily="34" charset="0"/>
+              </a:rPr>
+              <a:t>Uml diagram of project</a:t>
+            </a:r>
+          </a:p>
+        </p:txBody>
+      </p:sp>
+      <p:pic>
+        <p:nvPicPr>
+          <p:cNvPr id="7" name="Content Placeholder 6">
+            <a:extLst>
+              <a:ext uri="{FF2B5EF4-FFF2-40B4-BE49-F238E27FC236}">
+                <a16:creationId xmlns:a16="http://schemas.microsoft.com/office/drawing/2014/main" id="{89AEB1C1-B34B-50A7-4D77-805E6E49D8C5}"/>
+              </a:ext>
+            </a:extLst>
+          </p:cNvPr>
+          <p:cNvPicPr>
+            <a:picLocks noGrp="1" noChangeAspect="1"/>
+          </p:cNvPicPr>
+          <p:nvPr>
+            <p:ph idx="1"/>
+          </p:nvPr>
+        </p:nvPicPr>
+        <p:blipFill>
+          <a:blip r:embed="rId2"/>
+          <a:stretch>
+            <a:fillRect/>
+          </a:stretch>
+        </p:blipFill>
+        <p:spPr>
+          <a:xfrm>
+            <a:off x="214604" y="1156996"/>
+            <a:ext cx="11777873" cy="5665452"/>
+          </a:xfrm>
+        </p:spPr>
+      </p:pic>
     </p:spTree>
     <p:extLst>
       <p:ext uri="{BB962C8B-B14F-4D97-AF65-F5344CB8AC3E}">
-        <p14:creationId xmlns:p14="http://schemas.microsoft.com/office/powerpoint/2010/main" val="1150484880"/>
+        <p14:creationId xmlns:p14="http://schemas.microsoft.com/office/powerpoint/2010/main" val="1200283913"/>
       </p:ext>
     </p:extLst>
   </p:cSld>
@@ -6671,7 +7129,7 @@
           <p:cNvPr id="2" name="Title 1">
             <a:extLst>
               <a:ext uri="{FF2B5EF4-FFF2-40B4-BE49-F238E27FC236}">
-                <a16:creationId xmlns:a16="http://schemas.microsoft.com/office/drawing/2014/main" id="{8CC4F131-68C9-7331-B804-5651A3233051}"/>
+                <a16:creationId xmlns:a16="http://schemas.microsoft.com/office/drawing/2014/main" id="{2B1BE8EF-84FE-85BE-7417-4F4B8CB042C3}"/>
               </a:ext>
             </a:extLst>
           </p:cNvPr>
@@ -6682,65 +7140,145 @@
             <p:ph type="title"/>
           </p:nvPr>
         </p:nvSpPr>
-        <p:spPr>
-          <a:xfrm>
-            <a:off x="685801" y="609601"/>
-            <a:ext cx="10131425" cy="666750"/>
-          </a:xfrm>
-        </p:spPr>
+        <p:spPr/>
         <p:txBody>
           <a:bodyPr/>
           <a:lstStyle/>
           <a:p>
-            <a:pPr algn="ctr"/>
-            <a:r>
-              <a:rPr lang="en-IN" b="1" u="sng" dirty="0" err="1">
+            <a:r>
+              <a:rPr lang="en-IN" dirty="0">
+                <a:solidFill>
+                  <a:srgbClr val="FFFF00"/>
+                </a:solidFill>
                 <a:latin typeface="Arial Rounded MT Bold" panose="020F0704030504030204" pitchFamily="34" charset="0"/>
               </a:rPr>
-              <a:t>Uml</a:t>
-            </a:r>
-            <a:r>
-              <a:rPr lang="en-IN" b="1" u="sng" dirty="0">
-                <a:latin typeface="Arial Rounded MT Bold" panose="020F0704030504030204" pitchFamily="34" charset="0"/>
-              </a:rPr>
-              <a:t> diagram of project</a:t>
-            </a:r>
-          </a:p>
-        </p:txBody>
-      </p:sp>
-      <p:pic>
-        <p:nvPicPr>
-          <p:cNvPr id="18" name="Content Placeholder 17">
+              <a:t>Team Members and their roles</a:t>
+            </a:r>
+          </a:p>
+        </p:txBody>
+      </p:sp>
+      <p:sp>
+        <p:nvSpPr>
+          <p:cNvPr id="3" name="Content Placeholder 2">
             <a:extLst>
               <a:ext uri="{FF2B5EF4-FFF2-40B4-BE49-F238E27FC236}">
-                <a16:creationId xmlns:a16="http://schemas.microsoft.com/office/drawing/2014/main" id="{149621C5-BBBA-8170-F29E-BD3E654352BF}"/>
+                <a16:creationId xmlns:a16="http://schemas.microsoft.com/office/drawing/2014/main" id="{92AEBAD7-EC8B-8AFB-9C47-91D66E3ED5E6}"/>
               </a:ext>
             </a:extLst>
           </p:cNvPr>
-          <p:cNvPicPr>
-            <a:picLocks noGrp="1" noChangeAspect="1"/>
-          </p:cNvPicPr>
+          <p:cNvSpPr>
+            <a:spLocks noGrp="1"/>
+          </p:cNvSpPr>
           <p:nvPr>
             <p:ph idx="1"/>
           </p:nvPr>
-        </p:nvPicPr>
-        <p:blipFill>
-          <a:blip r:embed="rId2"/>
-          <a:stretch>
-            <a:fillRect/>
-          </a:stretch>
-        </p:blipFill>
-        <p:spPr>
-          <a:xfrm>
-            <a:off x="314325" y="1360969"/>
-            <a:ext cx="11392507" cy="5344632"/>
-          </a:xfrm>
-        </p:spPr>
-      </p:pic>
+        </p:nvSpPr>
+        <p:spPr/>
+        <p:txBody>
+          <a:bodyPr/>
+          <a:lstStyle/>
+          <a:p>
+            <a:pPr marL="0" indent="0">
+              <a:buNone/>
+            </a:pPr>
+            <a:r>
+              <a:rPr lang="en-IN" b="1" dirty="0"/>
+              <a:t>-&gt;</a:t>
+            </a:r>
+            <a:r>
+              <a:rPr lang="en-IN" dirty="0"/>
+              <a:t> </a:t>
+            </a:r>
+            <a:r>
+              <a:rPr lang="en-IN" dirty="0">
+                <a:latin typeface="Monotype Corsiva" panose="03010101010201010101" pitchFamily="66" charset="0"/>
+              </a:rPr>
+              <a:t>Aarav Nigam </a:t>
+            </a:r>
+            <a:r>
+              <a:rPr lang="en-IN" dirty="0"/>
+              <a:t>(S20210010002)</a:t>
+            </a:r>
+          </a:p>
+          <a:p>
+            <a:pPr marL="0" indent="0">
+              <a:buNone/>
+            </a:pPr>
+            <a:r>
+              <a:rPr lang="en-IN" dirty="0"/>
+              <a:t>	-Database Implementation</a:t>
+            </a:r>
+          </a:p>
+          <a:p>
+            <a:pPr marL="0" indent="0">
+              <a:buNone/>
+            </a:pPr>
+            <a:r>
+              <a:rPr lang="en-IN" dirty="0"/>
+              <a:t>	-GUI and Graph Plotting</a:t>
+            </a:r>
+          </a:p>
+          <a:p>
+            <a:pPr marL="0" indent="0">
+              <a:buNone/>
+            </a:pPr>
+            <a:r>
+              <a:rPr lang="en-IN" dirty="0"/>
+              <a:t>	-Implementation Of Data-Visualization Class</a:t>
+            </a:r>
+          </a:p>
+          <a:p>
+            <a:pPr marL="0" indent="0">
+              <a:buNone/>
+            </a:pPr>
+            <a:r>
+              <a:rPr lang="en-IN" b="1" dirty="0"/>
+              <a:t>-&gt; </a:t>
+            </a:r>
+            <a:r>
+              <a:rPr lang="en-IN" dirty="0">
+                <a:latin typeface="Monotype Corsiva" panose="03010101010201010101" pitchFamily="66" charset="0"/>
+              </a:rPr>
+              <a:t>Parth Bhandari </a:t>
+            </a:r>
+            <a:r>
+              <a:rPr lang="en-IN" dirty="0"/>
+              <a:t>(S20210010170)</a:t>
+            </a:r>
+          </a:p>
+          <a:p>
+            <a:pPr marL="0" indent="0">
+              <a:buNone/>
+            </a:pPr>
+            <a:r>
+              <a:rPr lang="en-IN" dirty="0"/>
+              <a:t>	-GUI and Graph Plotting</a:t>
+            </a:r>
+          </a:p>
+          <a:p>
+            <a:pPr marL="0" indent="0">
+              <a:buNone/>
+            </a:pPr>
+            <a:r>
+              <a:rPr lang="en-IN" dirty="0"/>
+              <a:t>	-Schema Structuring</a:t>
+            </a:r>
+          </a:p>
+          <a:p>
+            <a:pPr marL="0" indent="0">
+              <a:buNone/>
+            </a:pPr>
+            <a:r>
+              <a:rPr lang="en-IN" dirty="0"/>
+              <a:t>	-Implementing Searching and Sorting Functions</a:t>
+            </a:r>
+          </a:p>
+        </p:txBody>
+      </p:sp>
     </p:spTree>
     <p:extLst>
       <p:ext uri="{BB962C8B-B14F-4D97-AF65-F5344CB8AC3E}">
-        <p14:creationId xmlns:p14="http://schemas.microsoft.com/office/powerpoint/2010/main" val="1200283913"/>
+        <p14:creationId xmlns:p14="http://schemas.microsoft.com/office/powerpoint/2010/main" val="2541206612"/>
       </p:ext>
     </p:extLst>
   </p:cSld>
@@ -6769,164 +7307,6 @@
       </p:grpSpPr>
       <p:sp>
         <p:nvSpPr>
-          <p:cNvPr id="2" name="Title 1">
-            <a:extLst>
-              <a:ext uri="{FF2B5EF4-FFF2-40B4-BE49-F238E27FC236}">
-                <a16:creationId xmlns:a16="http://schemas.microsoft.com/office/drawing/2014/main" id="{2B1BE8EF-84FE-85BE-7417-4F4B8CB042C3}"/>
-              </a:ext>
-            </a:extLst>
-          </p:cNvPr>
-          <p:cNvSpPr>
-            <a:spLocks noGrp="1"/>
-          </p:cNvSpPr>
-          <p:nvPr>
-            <p:ph type="title"/>
-          </p:nvPr>
-        </p:nvSpPr>
-        <p:spPr/>
-        <p:txBody>
-          <a:bodyPr/>
-          <a:lstStyle/>
-          <a:p>
-            <a:r>
-              <a:rPr lang="en-IN" dirty="0">
-                <a:latin typeface="Arial Rounded MT Bold" panose="020F0704030504030204" pitchFamily="34" charset="0"/>
-              </a:rPr>
-              <a:t>Team Members and their roles</a:t>
-            </a:r>
-          </a:p>
-        </p:txBody>
-      </p:sp>
-      <p:sp>
-        <p:nvSpPr>
-          <p:cNvPr id="3" name="Content Placeholder 2">
-            <a:extLst>
-              <a:ext uri="{FF2B5EF4-FFF2-40B4-BE49-F238E27FC236}">
-                <a16:creationId xmlns:a16="http://schemas.microsoft.com/office/drawing/2014/main" id="{92AEBAD7-EC8B-8AFB-9C47-91D66E3ED5E6}"/>
-              </a:ext>
-            </a:extLst>
-          </p:cNvPr>
-          <p:cNvSpPr>
-            <a:spLocks noGrp="1"/>
-          </p:cNvSpPr>
-          <p:nvPr>
-            <p:ph idx="1"/>
-          </p:nvPr>
-        </p:nvSpPr>
-        <p:spPr/>
-        <p:txBody>
-          <a:bodyPr/>
-          <a:lstStyle/>
-          <a:p>
-            <a:pPr marL="0" indent="0">
-              <a:buNone/>
-            </a:pPr>
-            <a:r>
-              <a:rPr lang="en-IN" dirty="0"/>
-              <a:t>Aarav Nigam (S20210010002)</a:t>
-            </a:r>
-          </a:p>
-          <a:p>
-            <a:pPr marL="0" indent="0">
-              <a:buNone/>
-            </a:pPr>
-            <a:r>
-              <a:rPr lang="en-IN" dirty="0"/>
-              <a:t>	-Database Implementation</a:t>
-            </a:r>
-          </a:p>
-          <a:p>
-            <a:pPr marL="0" indent="0">
-              <a:buNone/>
-            </a:pPr>
-            <a:r>
-              <a:rPr lang="en-IN" dirty="0"/>
-              <a:t>	-GUI and Graph Plotting</a:t>
-            </a:r>
-          </a:p>
-          <a:p>
-            <a:pPr marL="0" indent="0">
-              <a:buNone/>
-            </a:pPr>
-            <a:r>
-              <a:rPr lang="en-IN" dirty="0"/>
-              <a:t>	-Implementation Of Data-Visualization Class</a:t>
-            </a:r>
-          </a:p>
-          <a:p>
-            <a:pPr marL="0" indent="0">
-              <a:buNone/>
-            </a:pPr>
-            <a:r>
-              <a:rPr lang="en-IN" dirty="0" err="1"/>
-              <a:t>Parth</a:t>
-            </a:r>
-            <a:r>
-              <a:rPr lang="en-IN" dirty="0"/>
-              <a:t> Bhandari (S20210010170)</a:t>
-            </a:r>
-          </a:p>
-          <a:p>
-            <a:pPr marL="0" indent="0">
-              <a:buNone/>
-            </a:pPr>
-            <a:r>
-              <a:rPr lang="en-IN" dirty="0"/>
-              <a:t>	-GUI and Graph Plotting</a:t>
-            </a:r>
-          </a:p>
-          <a:p>
-            <a:pPr marL="0" indent="0">
-              <a:buNone/>
-            </a:pPr>
-            <a:r>
-              <a:rPr lang="en-IN" dirty="0"/>
-              <a:t>	-Schema Structuring</a:t>
-            </a:r>
-          </a:p>
-          <a:p>
-            <a:pPr marL="0" indent="0">
-              <a:buNone/>
-            </a:pPr>
-            <a:r>
-              <a:rPr lang="en-IN" dirty="0"/>
-              <a:t>	-Implementing Searching and Sorting Functions</a:t>
-            </a:r>
-          </a:p>
-        </p:txBody>
-      </p:sp>
-    </p:spTree>
-    <p:extLst>
-      <p:ext uri="{BB962C8B-B14F-4D97-AF65-F5344CB8AC3E}">
-        <p14:creationId xmlns:p14="http://schemas.microsoft.com/office/powerpoint/2010/main" val="2541206612"/>
-      </p:ext>
-    </p:extLst>
-  </p:cSld>
-  <p:clrMapOvr>
-    <a:masterClrMapping/>
-  </p:clrMapOvr>
-</p:sld>
-</file>
-
-<file path=ppt/slides/slide9.xml><?xml version="1.0" encoding="utf-8"?>
-<p:sld xmlns:a="http://schemas.openxmlformats.org/drawingml/2006/main" xmlns:r="http://schemas.openxmlformats.org/officeDocument/2006/relationships" xmlns:p="http://schemas.openxmlformats.org/presentationml/2006/main">
-  <p:cSld>
-    <p:spTree>
-      <p:nvGrpSpPr>
-        <p:cNvPr id="1" name=""/>
-        <p:cNvGrpSpPr/>
-        <p:nvPr/>
-      </p:nvGrpSpPr>
-      <p:grpSpPr>
-        <a:xfrm>
-          <a:off x="0" y="0"/>
-          <a:ext cx="0" cy="0"/>
-          <a:chOff x="0" y="0"/>
-          <a:chExt cx="0" cy="0"/>
-        </a:xfrm>
-      </p:grpSpPr>
-      <p:sp>
-        <p:nvSpPr>
           <p:cNvPr id="3" name="Content Placeholder 2">
             <a:extLst>
               <a:ext uri="{FF2B5EF4-FFF2-40B4-BE49-F238E27FC236}">
@@ -6955,16 +7335,22 @@
               <a:buNone/>
             </a:pPr>
             <a:r>
+              <a:rPr lang="en-IN" b="1" dirty="0"/>
+              <a:t>-&gt;</a:t>
+            </a:r>
+            <a:r>
               <a:rPr lang="en-IN" dirty="0"/>
-              <a:t>3 </a:t>
-            </a:r>
-            <a:r>
-              <a:rPr lang="en-IN" dirty="0" err="1"/>
-              <a:t>Pratyush</a:t>
+              <a:t> </a:t>
+            </a:r>
+            <a:r>
+              <a:rPr lang="en-IN" dirty="0">
+                <a:latin typeface="Monotype Corsiva" panose="03010101010201010101" pitchFamily="66" charset="0"/>
+              </a:rPr>
+              <a:t>Pratyush Singh </a:t>
             </a:r>
             <a:r>
               <a:rPr lang="en-IN" dirty="0"/>
-              <a:t> Singh (S20210010183)</a:t>
+              <a:t>(S20210010183)</a:t>
             </a:r>
           </a:p>
           <a:p>
@@ -6999,16 +7385,18 @@
               <a:buNone/>
             </a:pPr>
             <a:r>
+              <a:rPr lang="en-IN" b="1" dirty="0"/>
+              <a:t>-&gt; </a:t>
+            </a:r>
+            <a:r>
+              <a:rPr lang="en-IN" dirty="0">
+                <a:latin typeface="Monotype Corsiva" panose="03010101010201010101" pitchFamily="66" charset="0"/>
+              </a:rPr>
+              <a:t>Mohd Rizwan </a:t>
+            </a:r>
+            <a:r>
               <a:rPr lang="en-IN" dirty="0"/>
-              <a:t>4 </a:t>
-            </a:r>
-            <a:r>
-              <a:rPr lang="en-IN" dirty="0" err="1"/>
-              <a:t>Mohd</a:t>
-            </a:r>
-            <a:r>
-              <a:rPr lang="en-IN" dirty="0"/>
-              <a:t> Rizwan (S20210010150)</a:t>
+              <a:t>(S20210010150)</a:t>
             </a:r>
           </a:p>
           <a:p>
@@ -7043,18 +7431,19 @@
               <a:buNone/>
             </a:pPr>
             <a:r>
+              <a:rPr lang="en-IN" b="1" dirty="0"/>
+              <a:t>-&gt; </a:t>
+            </a:r>
+            <a:r>
+              <a:rPr lang="en-IN" dirty="0">
+                <a:latin typeface="Monotype Corsiva" panose="03010101010201010101" pitchFamily="66" charset="0"/>
+              </a:rPr>
+              <a:t>Rathod Harshan </a:t>
+            </a:r>
+            <a:r>
               <a:rPr lang="en-IN" dirty="0"/>
-              <a:t>5 </a:t>
-            </a:r>
-            <a:r>
-              <a:rPr lang="en-IN" dirty="0" err="1"/>
-              <a:t>Harshan</a:t>
-            </a:r>
-            <a:r>
-              <a:rPr lang="en-IN"/>
-              <a:t> Rathod (S20210010189)</a:t>
-            </a:r>
-            <a:endParaRPr lang="en-IN" dirty="0"/>
+              <a:t>(S20210010189)</a:t>
+            </a:r>
           </a:p>
           <a:p>
             <a:pPr marL="0" indent="0">
@@ -7109,34 +7498,34 @@
         <a:sysClr val="window" lastClr="FFFFFF"/>
       </a:lt1>
       <a:dk2>
-        <a:srgbClr val="18276C"/>
+        <a:srgbClr val="3F296A"/>
       </a:dk2>
       <a:lt2>
         <a:srgbClr val="EBEBEB"/>
       </a:lt2>
       <a:accent1>
-        <a:srgbClr val="AC3EC1"/>
+        <a:srgbClr val="E84574"/>
       </a:accent1>
       <a:accent2>
-        <a:srgbClr val="477BD1"/>
+        <a:srgbClr val="798FF2"/>
       </a:accent2>
       <a:accent3>
-        <a:srgbClr val="46B298"/>
+        <a:srgbClr val="95C369"/>
       </a:accent3>
       <a:accent4>
-        <a:srgbClr val="90BA4C"/>
+        <a:srgbClr val="EE875A"/>
       </a:accent4>
       <a:accent5>
-        <a:srgbClr val="DD9D31"/>
+        <a:srgbClr val="C363E8"/>
       </a:accent5>
       <a:accent6>
-        <a:srgbClr val="E25247"/>
+        <a:srgbClr val="6AADC8"/>
       </a:accent6>
       <a:hlink>
-        <a:srgbClr val="C573D2"/>
+        <a:srgbClr val="FE80C7"/>
       </a:hlink>
       <a:folHlink>
-        <a:srgbClr val="CCAEE8"/>
+        <a:srgbClr val="FBA3EC"/>
       </a:folHlink>
     </a:clrScheme>
     <a:fontScheme name="Celestial">
@@ -7341,7 +7730,7 @@
   <a:extraClrSchemeLst/>
   <a:extLst>
     <a:ext uri="{05A4C25C-085E-4340-85A3-A5531E510DB2}">
-      <thm15:themeFamily xmlns:thm15="http://schemas.microsoft.com/office/thememl/2012/main" name="Celestial" id="{C4BB2A3D-0E93-4C5F-B0D2-9D3FCE089CC5}" vid="{42E5908D-19A2-46FD-89FA-638B126129EF}"/>
+      <thm15:themeFamily xmlns:thm15="http://schemas.microsoft.com/office/thememl/2012/main" name="Celestial" id="{C4BB2A3D-0E93-4C5F-B0D2-9D3FCE089CC5}" vid="{61DDDE80-2DFA-4F2A-B66F-72059846BDAA}"/>
     </a:ext>
   </a:extLst>
 </a:theme>

</xml_diff>